<commit_message>
fix vg llapi graphics
</commit_message>
<xml_diff>
--- a/PlatformDeveloperGuide/images/vgLL.pptx
+++ b/PlatformDeveloperGuide/images/vgLL.pptx
@@ -205,7 +205,7 @@
           <a:p>
             <a:fld id="{F47202D6-4449-4ABC-9430-570B72DCED4F}" type="datetimeFigureOut">
               <a:rPr lang="en-US" smtClean="0"/>
-              <a:t>22/08/31</a:t>
+              <a:t>22/09/02</a:t>
             </a:fld>
             <a:endParaRPr lang="en-US"/>
           </a:p>
@@ -957,7 +957,7 @@
           <a:p>
             <a:fld id="{4E285625-C24A-4341-90BC-6CD71F835625}" type="datetimeFigureOut">
               <a:rPr lang="en-GB" smtClean="0"/>
-              <a:t>31/08/2022</a:t>
+              <a:t>02/09/2022</a:t>
             </a:fld>
             <a:endParaRPr lang="en-GB"/>
           </a:p>
@@ -1157,7 +1157,7 @@
           <a:p>
             <a:fld id="{4E285625-C24A-4341-90BC-6CD71F835625}" type="datetimeFigureOut">
               <a:rPr lang="en-GB" smtClean="0"/>
-              <a:t>31/08/2022</a:t>
+              <a:t>02/09/2022</a:t>
             </a:fld>
             <a:endParaRPr lang="en-GB"/>
           </a:p>
@@ -1367,7 +1367,7 @@
           <a:p>
             <a:fld id="{4E285625-C24A-4341-90BC-6CD71F835625}" type="datetimeFigureOut">
               <a:rPr lang="en-GB" smtClean="0"/>
-              <a:t>31/08/2022</a:t>
+              <a:t>02/09/2022</a:t>
             </a:fld>
             <a:endParaRPr lang="en-GB"/>
           </a:p>
@@ -1567,7 +1567,7 @@
           <a:p>
             <a:fld id="{4E285625-C24A-4341-90BC-6CD71F835625}" type="datetimeFigureOut">
               <a:rPr lang="en-GB" smtClean="0"/>
-              <a:t>31/08/2022</a:t>
+              <a:t>02/09/2022</a:t>
             </a:fld>
             <a:endParaRPr lang="en-GB"/>
           </a:p>
@@ -1843,7 +1843,7 @@
           <a:p>
             <a:fld id="{4E285625-C24A-4341-90BC-6CD71F835625}" type="datetimeFigureOut">
               <a:rPr lang="en-GB" smtClean="0"/>
-              <a:t>31/08/2022</a:t>
+              <a:t>02/09/2022</a:t>
             </a:fld>
             <a:endParaRPr lang="en-GB"/>
           </a:p>
@@ -2111,7 +2111,7 @@
           <a:p>
             <a:fld id="{4E285625-C24A-4341-90BC-6CD71F835625}" type="datetimeFigureOut">
               <a:rPr lang="en-GB" smtClean="0"/>
-              <a:t>31/08/2022</a:t>
+              <a:t>02/09/2022</a:t>
             </a:fld>
             <a:endParaRPr lang="en-GB"/>
           </a:p>
@@ -2526,7 +2526,7 @@
           <a:p>
             <a:fld id="{4E285625-C24A-4341-90BC-6CD71F835625}" type="datetimeFigureOut">
               <a:rPr lang="en-GB" smtClean="0"/>
-              <a:t>31/08/2022</a:t>
+              <a:t>02/09/2022</a:t>
             </a:fld>
             <a:endParaRPr lang="en-GB"/>
           </a:p>
@@ -2668,7 +2668,7 @@
           <a:p>
             <a:fld id="{4E285625-C24A-4341-90BC-6CD71F835625}" type="datetimeFigureOut">
               <a:rPr lang="en-GB" smtClean="0"/>
-              <a:t>31/08/2022</a:t>
+              <a:t>02/09/2022</a:t>
             </a:fld>
             <a:endParaRPr lang="en-GB"/>
           </a:p>
@@ -2781,7 +2781,7 @@
           <a:p>
             <a:fld id="{4E285625-C24A-4341-90BC-6CD71F835625}" type="datetimeFigureOut">
               <a:rPr lang="en-GB" smtClean="0"/>
-              <a:t>31/08/2022</a:t>
+              <a:t>02/09/2022</a:t>
             </a:fld>
             <a:endParaRPr lang="en-GB"/>
           </a:p>
@@ -3094,7 +3094,7 @@
           <a:p>
             <a:fld id="{4E285625-C24A-4341-90BC-6CD71F835625}" type="datetimeFigureOut">
               <a:rPr lang="en-GB" smtClean="0"/>
-              <a:t>31/08/2022</a:t>
+              <a:t>02/09/2022</a:t>
             </a:fld>
             <a:endParaRPr lang="en-GB"/>
           </a:p>
@@ -3383,7 +3383,7 @@
           <a:p>
             <a:fld id="{4E285625-C24A-4341-90BC-6CD71F835625}" type="datetimeFigureOut">
               <a:rPr lang="en-GB" smtClean="0"/>
-              <a:t>31/08/2022</a:t>
+              <a:t>02/09/2022</a:t>
             </a:fld>
             <a:endParaRPr lang="en-GB"/>
           </a:p>
@@ -3626,7 +3626,7 @@
           <a:p>
             <a:fld id="{4E285625-C24A-4341-90BC-6CD71F835625}" type="datetimeFigureOut">
               <a:rPr lang="en-GB" smtClean="0"/>
-              <a:t>31/08/2022</a:t>
+              <a:t>02/09/2022</a:t>
             </a:fld>
             <a:endParaRPr lang="en-GB"/>
           </a:p>
@@ -7958,164 +7958,6 @@
       </p:sp>
       <p:sp>
         <p:nvSpPr>
-          <p:cNvPr id="57" name="Rounded Rectangle 39">
-            <a:extLst>
-              <a:ext uri="{FF2B5EF4-FFF2-40B4-BE49-F238E27FC236}">
-                <a16:creationId xmlns:a16="http://schemas.microsoft.com/office/drawing/2014/main" id="{5D813620-EE80-456F-AAD2-8C0830914AD5}"/>
-              </a:ext>
-            </a:extLst>
-          </p:cNvPr>
-          <p:cNvSpPr/>
-          <p:nvPr/>
-        </p:nvSpPr>
-        <p:spPr>
-          <a:xfrm>
-            <a:off x="1725332" y="2400869"/>
-            <a:ext cx="1645920" cy="288000"/>
-          </a:xfrm>
-          <a:prstGeom prst="roundRect">
-            <a:avLst/>
-          </a:prstGeom>
-          <a:solidFill>
-            <a:srgbClr val="00AEC7"/>
-          </a:solidFill>
-          <a:ln>
-            <a:noFill/>
-          </a:ln>
-        </p:spPr>
-        <p:style>
-          <a:lnRef idx="2">
-            <a:schemeClr val="accent1">
-              <a:shade val="50000"/>
-            </a:schemeClr>
-          </a:lnRef>
-          <a:fillRef idx="1">
-            <a:schemeClr val="accent1"/>
-          </a:fillRef>
-          <a:effectRef idx="0">
-            <a:schemeClr val="accent1"/>
-          </a:effectRef>
-          <a:fontRef idx="minor">
-            <a:schemeClr val="lt1"/>
-          </a:fontRef>
-        </p:style>
-        <p:txBody>
-          <a:bodyPr rtlCol="0" anchor="ctr"/>
-          <a:lstStyle>
-            <a:defPPr>
-              <a:defRPr lang="en-US"/>
-            </a:defPPr>
-            <a:lvl1pPr marL="0" algn="l" defTabSz="914377" rtl="0" eaLnBrk="1" latinLnBrk="0" hangingPunct="1">
-              <a:defRPr sz="1800" kern="1200">
-                <a:solidFill>
-                  <a:schemeClr val="lt1"/>
-                </a:solidFill>
-                <a:latin typeface="+mn-lt"/>
-                <a:ea typeface="+mn-ea"/>
-                <a:cs typeface="+mn-cs"/>
-              </a:defRPr>
-            </a:lvl1pPr>
-            <a:lvl2pPr marL="457189" algn="l" defTabSz="914377" rtl="0" eaLnBrk="1" latinLnBrk="0" hangingPunct="1">
-              <a:defRPr sz="1800" kern="1200">
-                <a:solidFill>
-                  <a:schemeClr val="lt1"/>
-                </a:solidFill>
-                <a:latin typeface="+mn-lt"/>
-                <a:ea typeface="+mn-ea"/>
-                <a:cs typeface="+mn-cs"/>
-              </a:defRPr>
-            </a:lvl2pPr>
-            <a:lvl3pPr marL="914377" algn="l" defTabSz="914377" rtl="0" eaLnBrk="1" latinLnBrk="0" hangingPunct="1">
-              <a:defRPr sz="1800" kern="1200">
-                <a:solidFill>
-                  <a:schemeClr val="lt1"/>
-                </a:solidFill>
-                <a:latin typeface="+mn-lt"/>
-                <a:ea typeface="+mn-ea"/>
-                <a:cs typeface="+mn-cs"/>
-              </a:defRPr>
-            </a:lvl3pPr>
-            <a:lvl4pPr marL="1371566" algn="l" defTabSz="914377" rtl="0" eaLnBrk="1" latinLnBrk="0" hangingPunct="1">
-              <a:defRPr sz="1800" kern="1200">
-                <a:solidFill>
-                  <a:schemeClr val="lt1"/>
-                </a:solidFill>
-                <a:latin typeface="+mn-lt"/>
-                <a:ea typeface="+mn-ea"/>
-                <a:cs typeface="+mn-cs"/>
-              </a:defRPr>
-            </a:lvl4pPr>
-            <a:lvl5pPr marL="1828754" algn="l" defTabSz="914377" rtl="0" eaLnBrk="1" latinLnBrk="0" hangingPunct="1">
-              <a:defRPr sz="1800" kern="1200">
-                <a:solidFill>
-                  <a:schemeClr val="lt1"/>
-                </a:solidFill>
-                <a:latin typeface="+mn-lt"/>
-                <a:ea typeface="+mn-ea"/>
-                <a:cs typeface="+mn-cs"/>
-              </a:defRPr>
-            </a:lvl5pPr>
-            <a:lvl6pPr marL="2285943" algn="l" defTabSz="914377" rtl="0" eaLnBrk="1" latinLnBrk="0" hangingPunct="1">
-              <a:defRPr sz="1800" kern="1200">
-                <a:solidFill>
-                  <a:schemeClr val="lt1"/>
-                </a:solidFill>
-                <a:latin typeface="+mn-lt"/>
-                <a:ea typeface="+mn-ea"/>
-                <a:cs typeface="+mn-cs"/>
-              </a:defRPr>
-            </a:lvl6pPr>
-            <a:lvl7pPr marL="2743131" algn="l" defTabSz="914377" rtl="0" eaLnBrk="1" latinLnBrk="0" hangingPunct="1">
-              <a:defRPr sz="1800" kern="1200">
-                <a:solidFill>
-                  <a:schemeClr val="lt1"/>
-                </a:solidFill>
-                <a:latin typeface="+mn-lt"/>
-                <a:ea typeface="+mn-ea"/>
-                <a:cs typeface="+mn-cs"/>
-              </a:defRPr>
-            </a:lvl7pPr>
-            <a:lvl8pPr marL="3200320" algn="l" defTabSz="914377" rtl="0" eaLnBrk="1" latinLnBrk="0" hangingPunct="1">
-              <a:defRPr sz="1800" kern="1200">
-                <a:solidFill>
-                  <a:schemeClr val="lt1"/>
-                </a:solidFill>
-                <a:latin typeface="+mn-lt"/>
-                <a:ea typeface="+mn-ea"/>
-                <a:cs typeface="+mn-cs"/>
-              </a:defRPr>
-            </a:lvl8pPr>
-            <a:lvl9pPr marL="3657509" algn="l" defTabSz="914377" rtl="0" eaLnBrk="1" latinLnBrk="0" hangingPunct="1">
-              <a:defRPr sz="1800" kern="1200">
-                <a:solidFill>
-                  <a:schemeClr val="lt1"/>
-                </a:solidFill>
-                <a:latin typeface="+mn-lt"/>
-                <a:ea typeface="+mn-ea"/>
-                <a:cs typeface="+mn-cs"/>
-              </a:defRPr>
-            </a:lvl9pPr>
-          </a:lstStyle>
-          <a:p>
-            <a:pPr algn="ctr"/>
-            <a:r>
-              <a:rPr lang="en-US" sz="1200" dirty="0" err="1">
-                <a:solidFill>
-                  <a:schemeClr val="bg1"/>
-                </a:solidFill>
-              </a:rPr>
-              <a:t>LLVG_MATRIX_impl.h</a:t>
-            </a:r>
-            <a:endParaRPr lang="en-US" sz="1200" dirty="0">
-              <a:solidFill>
-                <a:schemeClr val="bg1"/>
-              </a:solidFill>
-            </a:endParaRPr>
-          </a:p>
-        </p:txBody>
-      </p:sp>
-      <p:sp>
-        <p:nvSpPr>
           <p:cNvPr id="59" name="Rounded Rectangle 48">
             <a:extLst>
               <a:ext uri="{FF2B5EF4-FFF2-40B4-BE49-F238E27FC236}">
@@ -8379,6 +8221,164 @@
           <a:effectLst/>
         </p:spPr>
       </p:cxnSp>
+      <p:sp>
+        <p:nvSpPr>
+          <p:cNvPr id="57" name="Rounded Rectangle 39">
+            <a:extLst>
+              <a:ext uri="{FF2B5EF4-FFF2-40B4-BE49-F238E27FC236}">
+                <a16:creationId xmlns:a16="http://schemas.microsoft.com/office/drawing/2014/main" id="{5D813620-EE80-456F-AAD2-8C0830914AD5}"/>
+              </a:ext>
+            </a:extLst>
+          </p:cNvPr>
+          <p:cNvSpPr/>
+          <p:nvPr/>
+        </p:nvSpPr>
+        <p:spPr>
+          <a:xfrm>
+            <a:off x="1725332" y="2400869"/>
+            <a:ext cx="1645920" cy="288000"/>
+          </a:xfrm>
+          <a:prstGeom prst="roundRect">
+            <a:avLst/>
+          </a:prstGeom>
+          <a:solidFill>
+            <a:srgbClr val="00AEC7"/>
+          </a:solidFill>
+          <a:ln>
+            <a:noFill/>
+          </a:ln>
+        </p:spPr>
+        <p:style>
+          <a:lnRef idx="2">
+            <a:schemeClr val="accent1">
+              <a:shade val="50000"/>
+            </a:schemeClr>
+          </a:lnRef>
+          <a:fillRef idx="1">
+            <a:schemeClr val="accent1"/>
+          </a:fillRef>
+          <a:effectRef idx="0">
+            <a:schemeClr val="accent1"/>
+          </a:effectRef>
+          <a:fontRef idx="minor">
+            <a:schemeClr val="lt1"/>
+          </a:fontRef>
+        </p:style>
+        <p:txBody>
+          <a:bodyPr rtlCol="0" anchor="ctr"/>
+          <a:lstStyle>
+            <a:defPPr>
+              <a:defRPr lang="en-US"/>
+            </a:defPPr>
+            <a:lvl1pPr marL="0" algn="l" defTabSz="914377" rtl="0" eaLnBrk="1" latinLnBrk="0" hangingPunct="1">
+              <a:defRPr sz="1800" kern="1200">
+                <a:solidFill>
+                  <a:schemeClr val="lt1"/>
+                </a:solidFill>
+                <a:latin typeface="+mn-lt"/>
+                <a:ea typeface="+mn-ea"/>
+                <a:cs typeface="+mn-cs"/>
+              </a:defRPr>
+            </a:lvl1pPr>
+            <a:lvl2pPr marL="457189" algn="l" defTabSz="914377" rtl="0" eaLnBrk="1" latinLnBrk="0" hangingPunct="1">
+              <a:defRPr sz="1800" kern="1200">
+                <a:solidFill>
+                  <a:schemeClr val="lt1"/>
+                </a:solidFill>
+                <a:latin typeface="+mn-lt"/>
+                <a:ea typeface="+mn-ea"/>
+                <a:cs typeface="+mn-cs"/>
+              </a:defRPr>
+            </a:lvl2pPr>
+            <a:lvl3pPr marL="914377" algn="l" defTabSz="914377" rtl="0" eaLnBrk="1" latinLnBrk="0" hangingPunct="1">
+              <a:defRPr sz="1800" kern="1200">
+                <a:solidFill>
+                  <a:schemeClr val="lt1"/>
+                </a:solidFill>
+                <a:latin typeface="+mn-lt"/>
+                <a:ea typeface="+mn-ea"/>
+                <a:cs typeface="+mn-cs"/>
+              </a:defRPr>
+            </a:lvl3pPr>
+            <a:lvl4pPr marL="1371566" algn="l" defTabSz="914377" rtl="0" eaLnBrk="1" latinLnBrk="0" hangingPunct="1">
+              <a:defRPr sz="1800" kern="1200">
+                <a:solidFill>
+                  <a:schemeClr val="lt1"/>
+                </a:solidFill>
+                <a:latin typeface="+mn-lt"/>
+                <a:ea typeface="+mn-ea"/>
+                <a:cs typeface="+mn-cs"/>
+              </a:defRPr>
+            </a:lvl4pPr>
+            <a:lvl5pPr marL="1828754" algn="l" defTabSz="914377" rtl="0" eaLnBrk="1" latinLnBrk="0" hangingPunct="1">
+              <a:defRPr sz="1800" kern="1200">
+                <a:solidFill>
+                  <a:schemeClr val="lt1"/>
+                </a:solidFill>
+                <a:latin typeface="+mn-lt"/>
+                <a:ea typeface="+mn-ea"/>
+                <a:cs typeface="+mn-cs"/>
+              </a:defRPr>
+            </a:lvl5pPr>
+            <a:lvl6pPr marL="2285943" algn="l" defTabSz="914377" rtl="0" eaLnBrk="1" latinLnBrk="0" hangingPunct="1">
+              <a:defRPr sz="1800" kern="1200">
+                <a:solidFill>
+                  <a:schemeClr val="lt1"/>
+                </a:solidFill>
+                <a:latin typeface="+mn-lt"/>
+                <a:ea typeface="+mn-ea"/>
+                <a:cs typeface="+mn-cs"/>
+              </a:defRPr>
+            </a:lvl6pPr>
+            <a:lvl7pPr marL="2743131" algn="l" defTabSz="914377" rtl="0" eaLnBrk="1" latinLnBrk="0" hangingPunct="1">
+              <a:defRPr sz="1800" kern="1200">
+                <a:solidFill>
+                  <a:schemeClr val="lt1"/>
+                </a:solidFill>
+                <a:latin typeface="+mn-lt"/>
+                <a:ea typeface="+mn-ea"/>
+                <a:cs typeface="+mn-cs"/>
+              </a:defRPr>
+            </a:lvl7pPr>
+            <a:lvl8pPr marL="3200320" algn="l" defTabSz="914377" rtl="0" eaLnBrk="1" latinLnBrk="0" hangingPunct="1">
+              <a:defRPr sz="1800" kern="1200">
+                <a:solidFill>
+                  <a:schemeClr val="lt1"/>
+                </a:solidFill>
+                <a:latin typeface="+mn-lt"/>
+                <a:ea typeface="+mn-ea"/>
+                <a:cs typeface="+mn-cs"/>
+              </a:defRPr>
+            </a:lvl8pPr>
+            <a:lvl9pPr marL="3657509" algn="l" defTabSz="914377" rtl="0" eaLnBrk="1" latinLnBrk="0" hangingPunct="1">
+              <a:defRPr sz="1800" kern="1200">
+                <a:solidFill>
+                  <a:schemeClr val="lt1"/>
+                </a:solidFill>
+                <a:latin typeface="+mn-lt"/>
+                <a:ea typeface="+mn-ea"/>
+                <a:cs typeface="+mn-cs"/>
+              </a:defRPr>
+            </a:lvl9pPr>
+          </a:lstStyle>
+          <a:p>
+            <a:pPr algn="ctr"/>
+            <a:r>
+              <a:rPr lang="en-US" sz="1200" dirty="0" err="1">
+                <a:solidFill>
+                  <a:schemeClr val="bg1"/>
+                </a:solidFill>
+              </a:rPr>
+              <a:t>LLVG_MATRIX_impl.h</a:t>
+            </a:r>
+            <a:endParaRPr lang="en-US" sz="1200" dirty="0">
+              <a:solidFill>
+                <a:schemeClr val="bg1"/>
+              </a:solidFill>
+            </a:endParaRPr>
+          </a:p>
+        </p:txBody>
+      </p:sp>
     </p:spTree>
     <p:extLst>
       <p:ext uri="{BB962C8B-B14F-4D97-AF65-F5344CB8AC3E}">
@@ -8535,164 +8535,6 @@
       </p:sp>
       <p:sp>
         <p:nvSpPr>
-          <p:cNvPr id="13" name="Rounded Rectangle 12">
-            <a:extLst>
-              <a:ext uri="{FF2B5EF4-FFF2-40B4-BE49-F238E27FC236}">
-                <a16:creationId xmlns:a16="http://schemas.microsoft.com/office/drawing/2014/main" id="{DB796CC1-F8ED-43A6-AE21-7F6FA80A001F}"/>
-              </a:ext>
-            </a:extLst>
-          </p:cNvPr>
-          <p:cNvSpPr/>
-          <p:nvPr/>
-        </p:nvSpPr>
-        <p:spPr>
-          <a:xfrm>
-            <a:off x="706064" y="1485236"/>
-            <a:ext cx="1439844" cy="288000"/>
-          </a:xfrm>
-          <a:prstGeom prst="roundRect">
-            <a:avLst/>
-          </a:prstGeom>
-          <a:solidFill>
-            <a:srgbClr val="00AEC7"/>
-          </a:solidFill>
-          <a:ln>
-            <a:noFill/>
-          </a:ln>
-        </p:spPr>
-        <p:style>
-          <a:lnRef idx="2">
-            <a:schemeClr val="accent1">
-              <a:shade val="50000"/>
-            </a:schemeClr>
-          </a:lnRef>
-          <a:fillRef idx="1">
-            <a:schemeClr val="accent1"/>
-          </a:fillRef>
-          <a:effectRef idx="0">
-            <a:schemeClr val="accent1"/>
-          </a:effectRef>
-          <a:fontRef idx="minor">
-            <a:schemeClr val="lt1"/>
-          </a:fontRef>
-        </p:style>
-        <p:txBody>
-          <a:bodyPr rtlCol="0" anchor="ctr"/>
-          <a:lstStyle>
-            <a:defPPr>
-              <a:defRPr lang="en-US"/>
-            </a:defPPr>
-            <a:lvl1pPr marL="0" algn="l" defTabSz="914377" rtl="0" eaLnBrk="1" latinLnBrk="0" hangingPunct="1">
-              <a:defRPr sz="1800" kern="1200">
-                <a:solidFill>
-                  <a:schemeClr val="lt1"/>
-                </a:solidFill>
-                <a:latin typeface="+mn-lt"/>
-                <a:ea typeface="+mn-ea"/>
-                <a:cs typeface="+mn-cs"/>
-              </a:defRPr>
-            </a:lvl1pPr>
-            <a:lvl2pPr marL="457189" algn="l" defTabSz="914377" rtl="0" eaLnBrk="1" latinLnBrk="0" hangingPunct="1">
-              <a:defRPr sz="1800" kern="1200">
-                <a:solidFill>
-                  <a:schemeClr val="lt1"/>
-                </a:solidFill>
-                <a:latin typeface="+mn-lt"/>
-                <a:ea typeface="+mn-ea"/>
-                <a:cs typeface="+mn-cs"/>
-              </a:defRPr>
-            </a:lvl2pPr>
-            <a:lvl3pPr marL="914377" algn="l" defTabSz="914377" rtl="0" eaLnBrk="1" latinLnBrk="0" hangingPunct="1">
-              <a:defRPr sz="1800" kern="1200">
-                <a:solidFill>
-                  <a:schemeClr val="lt1"/>
-                </a:solidFill>
-                <a:latin typeface="+mn-lt"/>
-                <a:ea typeface="+mn-ea"/>
-                <a:cs typeface="+mn-cs"/>
-              </a:defRPr>
-            </a:lvl3pPr>
-            <a:lvl4pPr marL="1371566" algn="l" defTabSz="914377" rtl="0" eaLnBrk="1" latinLnBrk="0" hangingPunct="1">
-              <a:defRPr sz="1800" kern="1200">
-                <a:solidFill>
-                  <a:schemeClr val="lt1"/>
-                </a:solidFill>
-                <a:latin typeface="+mn-lt"/>
-                <a:ea typeface="+mn-ea"/>
-                <a:cs typeface="+mn-cs"/>
-              </a:defRPr>
-            </a:lvl4pPr>
-            <a:lvl5pPr marL="1828754" algn="l" defTabSz="914377" rtl="0" eaLnBrk="1" latinLnBrk="0" hangingPunct="1">
-              <a:defRPr sz="1800" kern="1200">
-                <a:solidFill>
-                  <a:schemeClr val="lt1"/>
-                </a:solidFill>
-                <a:latin typeface="+mn-lt"/>
-                <a:ea typeface="+mn-ea"/>
-                <a:cs typeface="+mn-cs"/>
-              </a:defRPr>
-            </a:lvl5pPr>
-            <a:lvl6pPr marL="2285943" algn="l" defTabSz="914377" rtl="0" eaLnBrk="1" latinLnBrk="0" hangingPunct="1">
-              <a:defRPr sz="1800" kern="1200">
-                <a:solidFill>
-                  <a:schemeClr val="lt1"/>
-                </a:solidFill>
-                <a:latin typeface="+mn-lt"/>
-                <a:ea typeface="+mn-ea"/>
-                <a:cs typeface="+mn-cs"/>
-              </a:defRPr>
-            </a:lvl6pPr>
-            <a:lvl7pPr marL="2743131" algn="l" defTabSz="914377" rtl="0" eaLnBrk="1" latinLnBrk="0" hangingPunct="1">
-              <a:defRPr sz="1800" kern="1200">
-                <a:solidFill>
-                  <a:schemeClr val="lt1"/>
-                </a:solidFill>
-                <a:latin typeface="+mn-lt"/>
-                <a:ea typeface="+mn-ea"/>
-                <a:cs typeface="+mn-cs"/>
-              </a:defRPr>
-            </a:lvl7pPr>
-            <a:lvl8pPr marL="3200320" algn="l" defTabSz="914377" rtl="0" eaLnBrk="1" latinLnBrk="0" hangingPunct="1">
-              <a:defRPr sz="1800" kern="1200">
-                <a:solidFill>
-                  <a:schemeClr val="lt1"/>
-                </a:solidFill>
-                <a:latin typeface="+mn-lt"/>
-                <a:ea typeface="+mn-ea"/>
-                <a:cs typeface="+mn-cs"/>
-              </a:defRPr>
-            </a:lvl8pPr>
-            <a:lvl9pPr marL="3657509" algn="l" defTabSz="914377" rtl="0" eaLnBrk="1" latinLnBrk="0" hangingPunct="1">
-              <a:defRPr sz="1800" kern="1200">
-                <a:solidFill>
-                  <a:schemeClr val="lt1"/>
-                </a:solidFill>
-                <a:latin typeface="+mn-lt"/>
-                <a:ea typeface="+mn-ea"/>
-                <a:cs typeface="+mn-cs"/>
-              </a:defRPr>
-            </a:lvl9pPr>
-          </a:lstStyle>
-          <a:p>
-            <a:pPr algn="ctr"/>
-            <a:r>
-              <a:rPr lang="en-US" sz="1100" dirty="0" err="1">
-                <a:solidFill>
-                  <a:schemeClr val="bg1"/>
-                </a:solidFill>
-              </a:rPr>
-              <a:t>LLVG_PATH_impl.h</a:t>
-            </a:r>
-            <a:endParaRPr lang="en-US" sz="1100" dirty="0">
-              <a:solidFill>
-                <a:schemeClr val="bg1"/>
-              </a:solidFill>
-            </a:endParaRPr>
-          </a:p>
-        </p:txBody>
-      </p:sp>
-      <p:sp>
-        <p:nvSpPr>
           <p:cNvPr id="15" name="Rounded Rectangle 15">
             <a:extLst>
               <a:ext uri="{FF2B5EF4-FFF2-40B4-BE49-F238E27FC236}">
@@ -8843,164 +8685,6 @@
               </a:rPr>
               <a:t>MICROVG</a:t>
             </a:r>
-          </a:p>
-        </p:txBody>
-      </p:sp>
-      <p:sp>
-        <p:nvSpPr>
-          <p:cNvPr id="17" name="Rounded Rectangle 17">
-            <a:extLst>
-              <a:ext uri="{FF2B5EF4-FFF2-40B4-BE49-F238E27FC236}">
-                <a16:creationId xmlns:a16="http://schemas.microsoft.com/office/drawing/2014/main" id="{095D8A88-ACB9-49C2-BADC-666B799FB62D}"/>
-              </a:ext>
-            </a:extLst>
-          </p:cNvPr>
-          <p:cNvSpPr/>
-          <p:nvPr/>
-        </p:nvSpPr>
-        <p:spPr>
-          <a:xfrm>
-            <a:off x="2357633" y="1485236"/>
-            <a:ext cx="1444752" cy="288000"/>
-          </a:xfrm>
-          <a:prstGeom prst="roundRect">
-            <a:avLst/>
-          </a:prstGeom>
-          <a:solidFill>
-            <a:srgbClr val="00AEC7"/>
-          </a:solidFill>
-          <a:ln>
-            <a:noFill/>
-          </a:ln>
-        </p:spPr>
-        <p:style>
-          <a:lnRef idx="2">
-            <a:schemeClr val="accent1">
-              <a:shade val="50000"/>
-            </a:schemeClr>
-          </a:lnRef>
-          <a:fillRef idx="1">
-            <a:schemeClr val="accent1"/>
-          </a:fillRef>
-          <a:effectRef idx="0">
-            <a:schemeClr val="accent1"/>
-          </a:effectRef>
-          <a:fontRef idx="minor">
-            <a:schemeClr val="lt1"/>
-          </a:fontRef>
-        </p:style>
-        <p:txBody>
-          <a:bodyPr rtlCol="0" anchor="ctr"/>
-          <a:lstStyle>
-            <a:defPPr>
-              <a:defRPr lang="en-US"/>
-            </a:defPPr>
-            <a:lvl1pPr marL="0" algn="l" defTabSz="914377" rtl="0" eaLnBrk="1" latinLnBrk="0" hangingPunct="1">
-              <a:defRPr sz="1800" kern="1200">
-                <a:solidFill>
-                  <a:schemeClr val="lt1"/>
-                </a:solidFill>
-                <a:latin typeface="+mn-lt"/>
-                <a:ea typeface="+mn-ea"/>
-                <a:cs typeface="+mn-cs"/>
-              </a:defRPr>
-            </a:lvl1pPr>
-            <a:lvl2pPr marL="457189" algn="l" defTabSz="914377" rtl="0" eaLnBrk="1" latinLnBrk="0" hangingPunct="1">
-              <a:defRPr sz="1800" kern="1200">
-                <a:solidFill>
-                  <a:schemeClr val="lt1"/>
-                </a:solidFill>
-                <a:latin typeface="+mn-lt"/>
-                <a:ea typeface="+mn-ea"/>
-                <a:cs typeface="+mn-cs"/>
-              </a:defRPr>
-            </a:lvl2pPr>
-            <a:lvl3pPr marL="914377" algn="l" defTabSz="914377" rtl="0" eaLnBrk="1" latinLnBrk="0" hangingPunct="1">
-              <a:defRPr sz="1800" kern="1200">
-                <a:solidFill>
-                  <a:schemeClr val="lt1"/>
-                </a:solidFill>
-                <a:latin typeface="+mn-lt"/>
-                <a:ea typeface="+mn-ea"/>
-                <a:cs typeface="+mn-cs"/>
-              </a:defRPr>
-            </a:lvl3pPr>
-            <a:lvl4pPr marL="1371566" algn="l" defTabSz="914377" rtl="0" eaLnBrk="1" latinLnBrk="0" hangingPunct="1">
-              <a:defRPr sz="1800" kern="1200">
-                <a:solidFill>
-                  <a:schemeClr val="lt1"/>
-                </a:solidFill>
-                <a:latin typeface="+mn-lt"/>
-                <a:ea typeface="+mn-ea"/>
-                <a:cs typeface="+mn-cs"/>
-              </a:defRPr>
-            </a:lvl4pPr>
-            <a:lvl5pPr marL="1828754" algn="l" defTabSz="914377" rtl="0" eaLnBrk="1" latinLnBrk="0" hangingPunct="1">
-              <a:defRPr sz="1800" kern="1200">
-                <a:solidFill>
-                  <a:schemeClr val="lt1"/>
-                </a:solidFill>
-                <a:latin typeface="+mn-lt"/>
-                <a:ea typeface="+mn-ea"/>
-                <a:cs typeface="+mn-cs"/>
-              </a:defRPr>
-            </a:lvl5pPr>
-            <a:lvl6pPr marL="2285943" algn="l" defTabSz="914377" rtl="0" eaLnBrk="1" latinLnBrk="0" hangingPunct="1">
-              <a:defRPr sz="1800" kern="1200">
-                <a:solidFill>
-                  <a:schemeClr val="lt1"/>
-                </a:solidFill>
-                <a:latin typeface="+mn-lt"/>
-                <a:ea typeface="+mn-ea"/>
-                <a:cs typeface="+mn-cs"/>
-              </a:defRPr>
-            </a:lvl6pPr>
-            <a:lvl7pPr marL="2743131" algn="l" defTabSz="914377" rtl="0" eaLnBrk="1" latinLnBrk="0" hangingPunct="1">
-              <a:defRPr sz="1800" kern="1200">
-                <a:solidFill>
-                  <a:schemeClr val="lt1"/>
-                </a:solidFill>
-                <a:latin typeface="+mn-lt"/>
-                <a:ea typeface="+mn-ea"/>
-                <a:cs typeface="+mn-cs"/>
-              </a:defRPr>
-            </a:lvl7pPr>
-            <a:lvl8pPr marL="3200320" algn="l" defTabSz="914377" rtl="0" eaLnBrk="1" latinLnBrk="0" hangingPunct="1">
-              <a:defRPr sz="1800" kern="1200">
-                <a:solidFill>
-                  <a:schemeClr val="lt1"/>
-                </a:solidFill>
-                <a:latin typeface="+mn-lt"/>
-                <a:ea typeface="+mn-ea"/>
-                <a:cs typeface="+mn-cs"/>
-              </a:defRPr>
-            </a:lvl8pPr>
-            <a:lvl9pPr marL="3657509" algn="l" defTabSz="914377" rtl="0" eaLnBrk="1" latinLnBrk="0" hangingPunct="1">
-              <a:defRPr sz="1800" kern="1200">
-                <a:solidFill>
-                  <a:schemeClr val="lt1"/>
-                </a:solidFill>
-                <a:latin typeface="+mn-lt"/>
-                <a:ea typeface="+mn-ea"/>
-                <a:cs typeface="+mn-cs"/>
-              </a:defRPr>
-            </a:lvl9pPr>
-          </a:lstStyle>
-          <a:p>
-            <a:pPr algn="ctr"/>
-            <a:r>
-              <a:rPr lang="en-US" sz="800" dirty="0" err="1">
-                <a:solidFill>
-                  <a:schemeClr val="bg1"/>
-                </a:solidFill>
-              </a:rPr>
-              <a:t>LLVG_PATH_PAINTER_impl.h</a:t>
-            </a:r>
-            <a:endParaRPr lang="en-US" sz="800" dirty="0">
-              <a:solidFill>
-                <a:schemeClr val="bg1"/>
-              </a:solidFill>
-            </a:endParaRPr>
           </a:p>
         </p:txBody>
       </p:sp>
@@ -9426,164 +9110,6 @@
       </p:sp>
       <p:sp>
         <p:nvSpPr>
-          <p:cNvPr id="7" name="Rounded Rectangle 17">
-            <a:extLst>
-              <a:ext uri="{FF2B5EF4-FFF2-40B4-BE49-F238E27FC236}">
-                <a16:creationId xmlns:a16="http://schemas.microsoft.com/office/drawing/2014/main" id="{400A150F-5610-E438-9A21-9CEC072C3A81}"/>
-              </a:ext>
-            </a:extLst>
-          </p:cNvPr>
-          <p:cNvSpPr/>
-          <p:nvPr/>
-        </p:nvSpPr>
-        <p:spPr>
-          <a:xfrm>
-            <a:off x="706064" y="2697592"/>
-            <a:ext cx="1439844" cy="288000"/>
-          </a:xfrm>
-          <a:prstGeom prst="roundRect">
-            <a:avLst/>
-          </a:prstGeom>
-          <a:solidFill>
-            <a:srgbClr val="00AEC7"/>
-          </a:solidFill>
-          <a:ln>
-            <a:noFill/>
-          </a:ln>
-        </p:spPr>
-        <p:style>
-          <a:lnRef idx="2">
-            <a:schemeClr val="accent1">
-              <a:shade val="50000"/>
-            </a:schemeClr>
-          </a:lnRef>
-          <a:fillRef idx="1">
-            <a:schemeClr val="accent1"/>
-          </a:fillRef>
-          <a:effectRef idx="0">
-            <a:schemeClr val="accent1"/>
-          </a:effectRef>
-          <a:fontRef idx="minor">
-            <a:schemeClr val="lt1"/>
-          </a:fontRef>
-        </p:style>
-        <p:txBody>
-          <a:bodyPr rtlCol="0" anchor="ctr"/>
-          <a:lstStyle>
-            <a:defPPr>
-              <a:defRPr lang="en-US"/>
-            </a:defPPr>
-            <a:lvl1pPr marL="0" algn="l" defTabSz="914377" rtl="0" eaLnBrk="1" latinLnBrk="0" hangingPunct="1">
-              <a:defRPr sz="1800" kern="1200">
-                <a:solidFill>
-                  <a:schemeClr val="lt1"/>
-                </a:solidFill>
-                <a:latin typeface="+mn-lt"/>
-                <a:ea typeface="+mn-ea"/>
-                <a:cs typeface="+mn-cs"/>
-              </a:defRPr>
-            </a:lvl1pPr>
-            <a:lvl2pPr marL="457189" algn="l" defTabSz="914377" rtl="0" eaLnBrk="1" latinLnBrk="0" hangingPunct="1">
-              <a:defRPr sz="1800" kern="1200">
-                <a:solidFill>
-                  <a:schemeClr val="lt1"/>
-                </a:solidFill>
-                <a:latin typeface="+mn-lt"/>
-                <a:ea typeface="+mn-ea"/>
-                <a:cs typeface="+mn-cs"/>
-              </a:defRPr>
-            </a:lvl2pPr>
-            <a:lvl3pPr marL="914377" algn="l" defTabSz="914377" rtl="0" eaLnBrk="1" latinLnBrk="0" hangingPunct="1">
-              <a:defRPr sz="1800" kern="1200">
-                <a:solidFill>
-                  <a:schemeClr val="lt1"/>
-                </a:solidFill>
-                <a:latin typeface="+mn-lt"/>
-                <a:ea typeface="+mn-ea"/>
-                <a:cs typeface="+mn-cs"/>
-              </a:defRPr>
-            </a:lvl3pPr>
-            <a:lvl4pPr marL="1371566" algn="l" defTabSz="914377" rtl="0" eaLnBrk="1" latinLnBrk="0" hangingPunct="1">
-              <a:defRPr sz="1800" kern="1200">
-                <a:solidFill>
-                  <a:schemeClr val="lt1"/>
-                </a:solidFill>
-                <a:latin typeface="+mn-lt"/>
-                <a:ea typeface="+mn-ea"/>
-                <a:cs typeface="+mn-cs"/>
-              </a:defRPr>
-            </a:lvl4pPr>
-            <a:lvl5pPr marL="1828754" algn="l" defTabSz="914377" rtl="0" eaLnBrk="1" latinLnBrk="0" hangingPunct="1">
-              <a:defRPr sz="1800" kern="1200">
-                <a:solidFill>
-                  <a:schemeClr val="lt1"/>
-                </a:solidFill>
-                <a:latin typeface="+mn-lt"/>
-                <a:ea typeface="+mn-ea"/>
-                <a:cs typeface="+mn-cs"/>
-              </a:defRPr>
-            </a:lvl5pPr>
-            <a:lvl6pPr marL="2285943" algn="l" defTabSz="914377" rtl="0" eaLnBrk="1" latinLnBrk="0" hangingPunct="1">
-              <a:defRPr sz="1800" kern="1200">
-                <a:solidFill>
-                  <a:schemeClr val="lt1"/>
-                </a:solidFill>
-                <a:latin typeface="+mn-lt"/>
-                <a:ea typeface="+mn-ea"/>
-                <a:cs typeface="+mn-cs"/>
-              </a:defRPr>
-            </a:lvl6pPr>
-            <a:lvl7pPr marL="2743131" algn="l" defTabSz="914377" rtl="0" eaLnBrk="1" latinLnBrk="0" hangingPunct="1">
-              <a:defRPr sz="1800" kern="1200">
-                <a:solidFill>
-                  <a:schemeClr val="lt1"/>
-                </a:solidFill>
-                <a:latin typeface="+mn-lt"/>
-                <a:ea typeface="+mn-ea"/>
-                <a:cs typeface="+mn-cs"/>
-              </a:defRPr>
-            </a:lvl7pPr>
-            <a:lvl8pPr marL="3200320" algn="l" defTabSz="914377" rtl="0" eaLnBrk="1" latinLnBrk="0" hangingPunct="1">
-              <a:defRPr sz="1800" kern="1200">
-                <a:solidFill>
-                  <a:schemeClr val="lt1"/>
-                </a:solidFill>
-                <a:latin typeface="+mn-lt"/>
-                <a:ea typeface="+mn-ea"/>
-                <a:cs typeface="+mn-cs"/>
-              </a:defRPr>
-            </a:lvl8pPr>
-            <a:lvl9pPr marL="3657509" algn="l" defTabSz="914377" rtl="0" eaLnBrk="1" latinLnBrk="0" hangingPunct="1">
-              <a:defRPr sz="1800" kern="1200">
-                <a:solidFill>
-                  <a:schemeClr val="lt1"/>
-                </a:solidFill>
-                <a:latin typeface="+mn-lt"/>
-                <a:ea typeface="+mn-ea"/>
-                <a:cs typeface="+mn-cs"/>
-              </a:defRPr>
-            </a:lvl9pPr>
-          </a:lstStyle>
-          <a:p>
-            <a:pPr algn="ctr"/>
-            <a:r>
-              <a:rPr lang="en-US" sz="1200" dirty="0" err="1">
-                <a:solidFill>
-                  <a:schemeClr val="bg1"/>
-                </a:solidFill>
-              </a:rPr>
-              <a:t>microvg_path.h</a:t>
-            </a:r>
-            <a:endParaRPr lang="en-US" sz="1200" dirty="0">
-              <a:solidFill>
-                <a:schemeClr val="bg1"/>
-              </a:solidFill>
-            </a:endParaRPr>
-          </a:p>
-        </p:txBody>
-      </p:sp>
-      <p:sp>
-        <p:nvSpPr>
           <p:cNvPr id="10" name="Rounded Rectangle 47">
             <a:extLst>
               <a:ext uri="{FF2B5EF4-FFF2-40B4-BE49-F238E27FC236}">
@@ -9793,7 +9319,7 @@
         <p:spPr>
           <a:xfrm flipV="1">
             <a:off x="1425986" y="889478"/>
-            <a:ext cx="0" cy="2554053"/>
+            <a:ext cx="0" cy="1434222"/>
           </a:xfrm>
           <a:prstGeom prst="line">
             <a:avLst/>
@@ -9812,6 +9338,517 @@
           <a:effectLst/>
         </p:spPr>
       </p:cxnSp>
+      <p:cxnSp>
+        <p:nvCxnSpPr>
+          <p:cNvPr id="4" name="Straight Connector 3">
+            <a:extLst>
+              <a:ext uri="{FF2B5EF4-FFF2-40B4-BE49-F238E27FC236}">
+                <a16:creationId xmlns:a16="http://schemas.microsoft.com/office/drawing/2014/main" id="{B293005E-4521-8726-1C48-8ACF24F69096}"/>
+              </a:ext>
+            </a:extLst>
+          </p:cNvPr>
+          <p:cNvCxnSpPr>
+            <a:cxnSpLocks/>
+            <a:endCxn id="6" idx="2"/>
+          </p:cNvCxnSpPr>
+          <p:nvPr/>
+        </p:nvCxnSpPr>
+        <p:spPr>
+          <a:xfrm flipV="1">
+            <a:off x="1425986" y="2611700"/>
+            <a:ext cx="0" cy="817300"/>
+          </a:xfrm>
+          <a:prstGeom prst="line">
+            <a:avLst/>
+          </a:prstGeom>
+          <a:noFill/>
+          <a:ln w="28575" cap="flat" cmpd="sng" algn="ctr">
+            <a:solidFill>
+              <a:srgbClr val="717D83">
+                <a:lumMod val="60000"/>
+                <a:lumOff val="40000"/>
+              </a:srgbClr>
+            </a:solidFill>
+            <a:prstDash val="solid"/>
+            <a:headEnd type="triangle"/>
+          </a:ln>
+          <a:effectLst/>
+        </p:spPr>
+      </p:cxnSp>
+      <p:sp>
+        <p:nvSpPr>
+          <p:cNvPr id="7" name="Rounded Rectangle 17">
+            <a:extLst>
+              <a:ext uri="{FF2B5EF4-FFF2-40B4-BE49-F238E27FC236}">
+                <a16:creationId xmlns:a16="http://schemas.microsoft.com/office/drawing/2014/main" id="{400A150F-5610-E438-9A21-9CEC072C3A81}"/>
+              </a:ext>
+            </a:extLst>
+          </p:cNvPr>
+          <p:cNvSpPr/>
+          <p:nvPr/>
+        </p:nvSpPr>
+        <p:spPr>
+          <a:xfrm>
+            <a:off x="706064" y="2697592"/>
+            <a:ext cx="1439844" cy="288000"/>
+          </a:xfrm>
+          <a:prstGeom prst="roundRect">
+            <a:avLst/>
+          </a:prstGeom>
+          <a:solidFill>
+            <a:srgbClr val="00AEC7"/>
+          </a:solidFill>
+          <a:ln>
+            <a:noFill/>
+          </a:ln>
+        </p:spPr>
+        <p:style>
+          <a:lnRef idx="2">
+            <a:schemeClr val="accent1">
+              <a:shade val="50000"/>
+            </a:schemeClr>
+          </a:lnRef>
+          <a:fillRef idx="1">
+            <a:schemeClr val="accent1"/>
+          </a:fillRef>
+          <a:effectRef idx="0">
+            <a:schemeClr val="accent1"/>
+          </a:effectRef>
+          <a:fontRef idx="minor">
+            <a:schemeClr val="lt1"/>
+          </a:fontRef>
+        </p:style>
+        <p:txBody>
+          <a:bodyPr rtlCol="0" anchor="ctr"/>
+          <a:lstStyle>
+            <a:defPPr>
+              <a:defRPr lang="en-US"/>
+            </a:defPPr>
+            <a:lvl1pPr marL="0" algn="l" defTabSz="914377" rtl="0" eaLnBrk="1" latinLnBrk="0" hangingPunct="1">
+              <a:defRPr sz="1800" kern="1200">
+                <a:solidFill>
+                  <a:schemeClr val="lt1"/>
+                </a:solidFill>
+                <a:latin typeface="+mn-lt"/>
+                <a:ea typeface="+mn-ea"/>
+                <a:cs typeface="+mn-cs"/>
+              </a:defRPr>
+            </a:lvl1pPr>
+            <a:lvl2pPr marL="457189" algn="l" defTabSz="914377" rtl="0" eaLnBrk="1" latinLnBrk="0" hangingPunct="1">
+              <a:defRPr sz="1800" kern="1200">
+                <a:solidFill>
+                  <a:schemeClr val="lt1"/>
+                </a:solidFill>
+                <a:latin typeface="+mn-lt"/>
+                <a:ea typeface="+mn-ea"/>
+                <a:cs typeface="+mn-cs"/>
+              </a:defRPr>
+            </a:lvl2pPr>
+            <a:lvl3pPr marL="914377" algn="l" defTabSz="914377" rtl="0" eaLnBrk="1" latinLnBrk="0" hangingPunct="1">
+              <a:defRPr sz="1800" kern="1200">
+                <a:solidFill>
+                  <a:schemeClr val="lt1"/>
+                </a:solidFill>
+                <a:latin typeface="+mn-lt"/>
+                <a:ea typeface="+mn-ea"/>
+                <a:cs typeface="+mn-cs"/>
+              </a:defRPr>
+            </a:lvl3pPr>
+            <a:lvl4pPr marL="1371566" algn="l" defTabSz="914377" rtl="0" eaLnBrk="1" latinLnBrk="0" hangingPunct="1">
+              <a:defRPr sz="1800" kern="1200">
+                <a:solidFill>
+                  <a:schemeClr val="lt1"/>
+                </a:solidFill>
+                <a:latin typeface="+mn-lt"/>
+                <a:ea typeface="+mn-ea"/>
+                <a:cs typeface="+mn-cs"/>
+              </a:defRPr>
+            </a:lvl4pPr>
+            <a:lvl5pPr marL="1828754" algn="l" defTabSz="914377" rtl="0" eaLnBrk="1" latinLnBrk="0" hangingPunct="1">
+              <a:defRPr sz="1800" kern="1200">
+                <a:solidFill>
+                  <a:schemeClr val="lt1"/>
+                </a:solidFill>
+                <a:latin typeface="+mn-lt"/>
+                <a:ea typeface="+mn-ea"/>
+                <a:cs typeface="+mn-cs"/>
+              </a:defRPr>
+            </a:lvl5pPr>
+            <a:lvl6pPr marL="2285943" algn="l" defTabSz="914377" rtl="0" eaLnBrk="1" latinLnBrk="0" hangingPunct="1">
+              <a:defRPr sz="1800" kern="1200">
+                <a:solidFill>
+                  <a:schemeClr val="lt1"/>
+                </a:solidFill>
+                <a:latin typeface="+mn-lt"/>
+                <a:ea typeface="+mn-ea"/>
+                <a:cs typeface="+mn-cs"/>
+              </a:defRPr>
+            </a:lvl6pPr>
+            <a:lvl7pPr marL="2743131" algn="l" defTabSz="914377" rtl="0" eaLnBrk="1" latinLnBrk="0" hangingPunct="1">
+              <a:defRPr sz="1800" kern="1200">
+                <a:solidFill>
+                  <a:schemeClr val="lt1"/>
+                </a:solidFill>
+                <a:latin typeface="+mn-lt"/>
+                <a:ea typeface="+mn-ea"/>
+                <a:cs typeface="+mn-cs"/>
+              </a:defRPr>
+            </a:lvl7pPr>
+            <a:lvl8pPr marL="3200320" algn="l" defTabSz="914377" rtl="0" eaLnBrk="1" latinLnBrk="0" hangingPunct="1">
+              <a:defRPr sz="1800" kern="1200">
+                <a:solidFill>
+                  <a:schemeClr val="lt1"/>
+                </a:solidFill>
+                <a:latin typeface="+mn-lt"/>
+                <a:ea typeface="+mn-ea"/>
+                <a:cs typeface="+mn-cs"/>
+              </a:defRPr>
+            </a:lvl8pPr>
+            <a:lvl9pPr marL="3657509" algn="l" defTabSz="914377" rtl="0" eaLnBrk="1" latinLnBrk="0" hangingPunct="1">
+              <a:defRPr sz="1800" kern="1200">
+                <a:solidFill>
+                  <a:schemeClr val="lt1"/>
+                </a:solidFill>
+                <a:latin typeface="+mn-lt"/>
+                <a:ea typeface="+mn-ea"/>
+                <a:cs typeface="+mn-cs"/>
+              </a:defRPr>
+            </a:lvl9pPr>
+          </a:lstStyle>
+          <a:p>
+            <a:pPr algn="ctr"/>
+            <a:r>
+              <a:rPr lang="en-US" sz="1200" dirty="0" err="1">
+                <a:solidFill>
+                  <a:schemeClr val="bg1"/>
+                </a:solidFill>
+              </a:rPr>
+              <a:t>microvg_path.h</a:t>
+            </a:r>
+            <a:endParaRPr lang="en-US" sz="1200" dirty="0">
+              <a:solidFill>
+                <a:schemeClr val="bg1"/>
+              </a:solidFill>
+            </a:endParaRPr>
+          </a:p>
+        </p:txBody>
+      </p:sp>
+      <p:sp>
+        <p:nvSpPr>
+          <p:cNvPr id="17" name="Rounded Rectangle 17">
+            <a:extLst>
+              <a:ext uri="{FF2B5EF4-FFF2-40B4-BE49-F238E27FC236}">
+                <a16:creationId xmlns:a16="http://schemas.microsoft.com/office/drawing/2014/main" id="{095D8A88-ACB9-49C2-BADC-666B799FB62D}"/>
+              </a:ext>
+            </a:extLst>
+          </p:cNvPr>
+          <p:cNvSpPr/>
+          <p:nvPr/>
+        </p:nvSpPr>
+        <p:spPr>
+          <a:xfrm>
+            <a:off x="2357633" y="1485236"/>
+            <a:ext cx="1444752" cy="288000"/>
+          </a:xfrm>
+          <a:prstGeom prst="roundRect">
+            <a:avLst/>
+          </a:prstGeom>
+          <a:solidFill>
+            <a:srgbClr val="00AEC7"/>
+          </a:solidFill>
+          <a:ln>
+            <a:noFill/>
+          </a:ln>
+        </p:spPr>
+        <p:style>
+          <a:lnRef idx="2">
+            <a:schemeClr val="accent1">
+              <a:shade val="50000"/>
+            </a:schemeClr>
+          </a:lnRef>
+          <a:fillRef idx="1">
+            <a:schemeClr val="accent1"/>
+          </a:fillRef>
+          <a:effectRef idx="0">
+            <a:schemeClr val="accent1"/>
+          </a:effectRef>
+          <a:fontRef idx="minor">
+            <a:schemeClr val="lt1"/>
+          </a:fontRef>
+        </p:style>
+        <p:txBody>
+          <a:bodyPr rtlCol="0" anchor="ctr"/>
+          <a:lstStyle>
+            <a:defPPr>
+              <a:defRPr lang="en-US"/>
+            </a:defPPr>
+            <a:lvl1pPr marL="0" algn="l" defTabSz="914377" rtl="0" eaLnBrk="1" latinLnBrk="0" hangingPunct="1">
+              <a:defRPr sz="1800" kern="1200">
+                <a:solidFill>
+                  <a:schemeClr val="lt1"/>
+                </a:solidFill>
+                <a:latin typeface="+mn-lt"/>
+                <a:ea typeface="+mn-ea"/>
+                <a:cs typeface="+mn-cs"/>
+              </a:defRPr>
+            </a:lvl1pPr>
+            <a:lvl2pPr marL="457189" algn="l" defTabSz="914377" rtl="0" eaLnBrk="1" latinLnBrk="0" hangingPunct="1">
+              <a:defRPr sz="1800" kern="1200">
+                <a:solidFill>
+                  <a:schemeClr val="lt1"/>
+                </a:solidFill>
+                <a:latin typeface="+mn-lt"/>
+                <a:ea typeface="+mn-ea"/>
+                <a:cs typeface="+mn-cs"/>
+              </a:defRPr>
+            </a:lvl2pPr>
+            <a:lvl3pPr marL="914377" algn="l" defTabSz="914377" rtl="0" eaLnBrk="1" latinLnBrk="0" hangingPunct="1">
+              <a:defRPr sz="1800" kern="1200">
+                <a:solidFill>
+                  <a:schemeClr val="lt1"/>
+                </a:solidFill>
+                <a:latin typeface="+mn-lt"/>
+                <a:ea typeface="+mn-ea"/>
+                <a:cs typeface="+mn-cs"/>
+              </a:defRPr>
+            </a:lvl3pPr>
+            <a:lvl4pPr marL="1371566" algn="l" defTabSz="914377" rtl="0" eaLnBrk="1" latinLnBrk="0" hangingPunct="1">
+              <a:defRPr sz="1800" kern="1200">
+                <a:solidFill>
+                  <a:schemeClr val="lt1"/>
+                </a:solidFill>
+                <a:latin typeface="+mn-lt"/>
+                <a:ea typeface="+mn-ea"/>
+                <a:cs typeface="+mn-cs"/>
+              </a:defRPr>
+            </a:lvl4pPr>
+            <a:lvl5pPr marL="1828754" algn="l" defTabSz="914377" rtl="0" eaLnBrk="1" latinLnBrk="0" hangingPunct="1">
+              <a:defRPr sz="1800" kern="1200">
+                <a:solidFill>
+                  <a:schemeClr val="lt1"/>
+                </a:solidFill>
+                <a:latin typeface="+mn-lt"/>
+                <a:ea typeface="+mn-ea"/>
+                <a:cs typeface="+mn-cs"/>
+              </a:defRPr>
+            </a:lvl5pPr>
+            <a:lvl6pPr marL="2285943" algn="l" defTabSz="914377" rtl="0" eaLnBrk="1" latinLnBrk="0" hangingPunct="1">
+              <a:defRPr sz="1800" kern="1200">
+                <a:solidFill>
+                  <a:schemeClr val="lt1"/>
+                </a:solidFill>
+                <a:latin typeface="+mn-lt"/>
+                <a:ea typeface="+mn-ea"/>
+                <a:cs typeface="+mn-cs"/>
+              </a:defRPr>
+            </a:lvl6pPr>
+            <a:lvl7pPr marL="2743131" algn="l" defTabSz="914377" rtl="0" eaLnBrk="1" latinLnBrk="0" hangingPunct="1">
+              <a:defRPr sz="1800" kern="1200">
+                <a:solidFill>
+                  <a:schemeClr val="lt1"/>
+                </a:solidFill>
+                <a:latin typeface="+mn-lt"/>
+                <a:ea typeface="+mn-ea"/>
+                <a:cs typeface="+mn-cs"/>
+              </a:defRPr>
+            </a:lvl7pPr>
+            <a:lvl8pPr marL="3200320" algn="l" defTabSz="914377" rtl="0" eaLnBrk="1" latinLnBrk="0" hangingPunct="1">
+              <a:defRPr sz="1800" kern="1200">
+                <a:solidFill>
+                  <a:schemeClr val="lt1"/>
+                </a:solidFill>
+                <a:latin typeface="+mn-lt"/>
+                <a:ea typeface="+mn-ea"/>
+                <a:cs typeface="+mn-cs"/>
+              </a:defRPr>
+            </a:lvl8pPr>
+            <a:lvl9pPr marL="3657509" algn="l" defTabSz="914377" rtl="0" eaLnBrk="1" latinLnBrk="0" hangingPunct="1">
+              <a:defRPr sz="1800" kern="1200">
+                <a:solidFill>
+                  <a:schemeClr val="lt1"/>
+                </a:solidFill>
+                <a:latin typeface="+mn-lt"/>
+                <a:ea typeface="+mn-ea"/>
+                <a:cs typeface="+mn-cs"/>
+              </a:defRPr>
+            </a:lvl9pPr>
+          </a:lstStyle>
+          <a:p>
+            <a:pPr algn="ctr"/>
+            <a:r>
+              <a:rPr lang="en-US" sz="800" dirty="0" err="1">
+                <a:solidFill>
+                  <a:schemeClr val="bg1"/>
+                </a:solidFill>
+              </a:rPr>
+              <a:t>LLVG_PATH_PAINTER_impl.h</a:t>
+            </a:r>
+            <a:endParaRPr lang="en-US" sz="800" dirty="0">
+              <a:solidFill>
+                <a:schemeClr val="bg1"/>
+              </a:solidFill>
+            </a:endParaRPr>
+          </a:p>
+        </p:txBody>
+      </p:sp>
+      <p:sp>
+        <p:nvSpPr>
+          <p:cNvPr id="13" name="Rounded Rectangle 12">
+            <a:extLst>
+              <a:ext uri="{FF2B5EF4-FFF2-40B4-BE49-F238E27FC236}">
+                <a16:creationId xmlns:a16="http://schemas.microsoft.com/office/drawing/2014/main" id="{DB796CC1-F8ED-43A6-AE21-7F6FA80A001F}"/>
+              </a:ext>
+            </a:extLst>
+          </p:cNvPr>
+          <p:cNvSpPr/>
+          <p:nvPr/>
+        </p:nvSpPr>
+        <p:spPr>
+          <a:xfrm>
+            <a:off x="706064" y="1485236"/>
+            <a:ext cx="1439844" cy="288000"/>
+          </a:xfrm>
+          <a:prstGeom prst="roundRect">
+            <a:avLst/>
+          </a:prstGeom>
+          <a:solidFill>
+            <a:srgbClr val="00AEC7"/>
+          </a:solidFill>
+          <a:ln>
+            <a:noFill/>
+          </a:ln>
+        </p:spPr>
+        <p:style>
+          <a:lnRef idx="2">
+            <a:schemeClr val="accent1">
+              <a:shade val="50000"/>
+            </a:schemeClr>
+          </a:lnRef>
+          <a:fillRef idx="1">
+            <a:schemeClr val="accent1"/>
+          </a:fillRef>
+          <a:effectRef idx="0">
+            <a:schemeClr val="accent1"/>
+          </a:effectRef>
+          <a:fontRef idx="minor">
+            <a:schemeClr val="lt1"/>
+          </a:fontRef>
+        </p:style>
+        <p:txBody>
+          <a:bodyPr rtlCol="0" anchor="ctr"/>
+          <a:lstStyle>
+            <a:defPPr>
+              <a:defRPr lang="en-US"/>
+            </a:defPPr>
+            <a:lvl1pPr marL="0" algn="l" defTabSz="914377" rtl="0" eaLnBrk="1" latinLnBrk="0" hangingPunct="1">
+              <a:defRPr sz="1800" kern="1200">
+                <a:solidFill>
+                  <a:schemeClr val="lt1"/>
+                </a:solidFill>
+                <a:latin typeface="+mn-lt"/>
+                <a:ea typeface="+mn-ea"/>
+                <a:cs typeface="+mn-cs"/>
+              </a:defRPr>
+            </a:lvl1pPr>
+            <a:lvl2pPr marL="457189" algn="l" defTabSz="914377" rtl="0" eaLnBrk="1" latinLnBrk="0" hangingPunct="1">
+              <a:defRPr sz="1800" kern="1200">
+                <a:solidFill>
+                  <a:schemeClr val="lt1"/>
+                </a:solidFill>
+                <a:latin typeface="+mn-lt"/>
+                <a:ea typeface="+mn-ea"/>
+                <a:cs typeface="+mn-cs"/>
+              </a:defRPr>
+            </a:lvl2pPr>
+            <a:lvl3pPr marL="914377" algn="l" defTabSz="914377" rtl="0" eaLnBrk="1" latinLnBrk="0" hangingPunct="1">
+              <a:defRPr sz="1800" kern="1200">
+                <a:solidFill>
+                  <a:schemeClr val="lt1"/>
+                </a:solidFill>
+                <a:latin typeface="+mn-lt"/>
+                <a:ea typeface="+mn-ea"/>
+                <a:cs typeface="+mn-cs"/>
+              </a:defRPr>
+            </a:lvl3pPr>
+            <a:lvl4pPr marL="1371566" algn="l" defTabSz="914377" rtl="0" eaLnBrk="1" latinLnBrk="0" hangingPunct="1">
+              <a:defRPr sz="1800" kern="1200">
+                <a:solidFill>
+                  <a:schemeClr val="lt1"/>
+                </a:solidFill>
+                <a:latin typeface="+mn-lt"/>
+                <a:ea typeface="+mn-ea"/>
+                <a:cs typeface="+mn-cs"/>
+              </a:defRPr>
+            </a:lvl4pPr>
+            <a:lvl5pPr marL="1828754" algn="l" defTabSz="914377" rtl="0" eaLnBrk="1" latinLnBrk="0" hangingPunct="1">
+              <a:defRPr sz="1800" kern="1200">
+                <a:solidFill>
+                  <a:schemeClr val="lt1"/>
+                </a:solidFill>
+                <a:latin typeface="+mn-lt"/>
+                <a:ea typeface="+mn-ea"/>
+                <a:cs typeface="+mn-cs"/>
+              </a:defRPr>
+            </a:lvl5pPr>
+            <a:lvl6pPr marL="2285943" algn="l" defTabSz="914377" rtl="0" eaLnBrk="1" latinLnBrk="0" hangingPunct="1">
+              <a:defRPr sz="1800" kern="1200">
+                <a:solidFill>
+                  <a:schemeClr val="lt1"/>
+                </a:solidFill>
+                <a:latin typeface="+mn-lt"/>
+                <a:ea typeface="+mn-ea"/>
+                <a:cs typeface="+mn-cs"/>
+              </a:defRPr>
+            </a:lvl6pPr>
+            <a:lvl7pPr marL="2743131" algn="l" defTabSz="914377" rtl="0" eaLnBrk="1" latinLnBrk="0" hangingPunct="1">
+              <a:defRPr sz="1800" kern="1200">
+                <a:solidFill>
+                  <a:schemeClr val="lt1"/>
+                </a:solidFill>
+                <a:latin typeface="+mn-lt"/>
+                <a:ea typeface="+mn-ea"/>
+                <a:cs typeface="+mn-cs"/>
+              </a:defRPr>
+            </a:lvl7pPr>
+            <a:lvl8pPr marL="3200320" algn="l" defTabSz="914377" rtl="0" eaLnBrk="1" latinLnBrk="0" hangingPunct="1">
+              <a:defRPr sz="1800" kern="1200">
+                <a:solidFill>
+                  <a:schemeClr val="lt1"/>
+                </a:solidFill>
+                <a:latin typeface="+mn-lt"/>
+                <a:ea typeface="+mn-ea"/>
+                <a:cs typeface="+mn-cs"/>
+              </a:defRPr>
+            </a:lvl8pPr>
+            <a:lvl9pPr marL="3657509" algn="l" defTabSz="914377" rtl="0" eaLnBrk="1" latinLnBrk="0" hangingPunct="1">
+              <a:defRPr sz="1800" kern="1200">
+                <a:solidFill>
+                  <a:schemeClr val="lt1"/>
+                </a:solidFill>
+                <a:latin typeface="+mn-lt"/>
+                <a:ea typeface="+mn-ea"/>
+                <a:cs typeface="+mn-cs"/>
+              </a:defRPr>
+            </a:lvl9pPr>
+          </a:lstStyle>
+          <a:p>
+            <a:pPr algn="ctr"/>
+            <a:r>
+              <a:rPr lang="en-US" sz="1100" dirty="0" err="1">
+                <a:solidFill>
+                  <a:schemeClr val="bg1"/>
+                </a:solidFill>
+              </a:rPr>
+              <a:t>LLVG_PATH_impl.h</a:t>
+            </a:r>
+            <a:endParaRPr lang="en-US" sz="1100" dirty="0">
+              <a:solidFill>
+                <a:schemeClr val="bg1"/>
+              </a:solidFill>
+            </a:endParaRPr>
+          </a:p>
+        </p:txBody>
+      </p:sp>
     </p:spTree>
     <p:extLst>
       <p:ext uri="{BB962C8B-B14F-4D97-AF65-F5344CB8AC3E}">
@@ -9968,164 +10005,6 @@
       </p:sp>
       <p:sp>
         <p:nvSpPr>
-          <p:cNvPr id="13" name="Rounded Rectangle 12">
-            <a:extLst>
-              <a:ext uri="{FF2B5EF4-FFF2-40B4-BE49-F238E27FC236}">
-                <a16:creationId xmlns:a16="http://schemas.microsoft.com/office/drawing/2014/main" id="{DB796CC1-F8ED-43A6-AE21-7F6FA80A001F}"/>
-              </a:ext>
-            </a:extLst>
-          </p:cNvPr>
-          <p:cNvSpPr/>
-          <p:nvPr/>
-        </p:nvSpPr>
-        <p:spPr>
-          <a:xfrm>
-            <a:off x="706064" y="1485236"/>
-            <a:ext cx="1439844" cy="288000"/>
-          </a:xfrm>
-          <a:prstGeom prst="roundRect">
-            <a:avLst/>
-          </a:prstGeom>
-          <a:solidFill>
-            <a:srgbClr val="00AEC7"/>
-          </a:solidFill>
-          <a:ln>
-            <a:noFill/>
-          </a:ln>
-        </p:spPr>
-        <p:style>
-          <a:lnRef idx="2">
-            <a:schemeClr val="accent1">
-              <a:shade val="50000"/>
-            </a:schemeClr>
-          </a:lnRef>
-          <a:fillRef idx="1">
-            <a:schemeClr val="accent1"/>
-          </a:fillRef>
-          <a:effectRef idx="0">
-            <a:schemeClr val="accent1"/>
-          </a:effectRef>
-          <a:fontRef idx="minor">
-            <a:schemeClr val="lt1"/>
-          </a:fontRef>
-        </p:style>
-        <p:txBody>
-          <a:bodyPr rtlCol="0" anchor="ctr"/>
-          <a:lstStyle>
-            <a:defPPr>
-              <a:defRPr lang="en-US"/>
-            </a:defPPr>
-            <a:lvl1pPr marL="0" algn="l" defTabSz="914377" rtl="0" eaLnBrk="1" latinLnBrk="0" hangingPunct="1">
-              <a:defRPr sz="1800" kern="1200">
-                <a:solidFill>
-                  <a:schemeClr val="lt1"/>
-                </a:solidFill>
-                <a:latin typeface="+mn-lt"/>
-                <a:ea typeface="+mn-ea"/>
-                <a:cs typeface="+mn-cs"/>
-              </a:defRPr>
-            </a:lvl1pPr>
-            <a:lvl2pPr marL="457189" algn="l" defTabSz="914377" rtl="0" eaLnBrk="1" latinLnBrk="0" hangingPunct="1">
-              <a:defRPr sz="1800" kern="1200">
-                <a:solidFill>
-                  <a:schemeClr val="lt1"/>
-                </a:solidFill>
-                <a:latin typeface="+mn-lt"/>
-                <a:ea typeface="+mn-ea"/>
-                <a:cs typeface="+mn-cs"/>
-              </a:defRPr>
-            </a:lvl2pPr>
-            <a:lvl3pPr marL="914377" algn="l" defTabSz="914377" rtl="0" eaLnBrk="1" latinLnBrk="0" hangingPunct="1">
-              <a:defRPr sz="1800" kern="1200">
-                <a:solidFill>
-                  <a:schemeClr val="lt1"/>
-                </a:solidFill>
-                <a:latin typeface="+mn-lt"/>
-                <a:ea typeface="+mn-ea"/>
-                <a:cs typeface="+mn-cs"/>
-              </a:defRPr>
-            </a:lvl3pPr>
-            <a:lvl4pPr marL="1371566" algn="l" defTabSz="914377" rtl="0" eaLnBrk="1" latinLnBrk="0" hangingPunct="1">
-              <a:defRPr sz="1800" kern="1200">
-                <a:solidFill>
-                  <a:schemeClr val="lt1"/>
-                </a:solidFill>
-                <a:latin typeface="+mn-lt"/>
-                <a:ea typeface="+mn-ea"/>
-                <a:cs typeface="+mn-cs"/>
-              </a:defRPr>
-            </a:lvl4pPr>
-            <a:lvl5pPr marL="1828754" algn="l" defTabSz="914377" rtl="0" eaLnBrk="1" latinLnBrk="0" hangingPunct="1">
-              <a:defRPr sz="1800" kern="1200">
-                <a:solidFill>
-                  <a:schemeClr val="lt1"/>
-                </a:solidFill>
-                <a:latin typeface="+mn-lt"/>
-                <a:ea typeface="+mn-ea"/>
-                <a:cs typeface="+mn-cs"/>
-              </a:defRPr>
-            </a:lvl5pPr>
-            <a:lvl6pPr marL="2285943" algn="l" defTabSz="914377" rtl="0" eaLnBrk="1" latinLnBrk="0" hangingPunct="1">
-              <a:defRPr sz="1800" kern="1200">
-                <a:solidFill>
-                  <a:schemeClr val="lt1"/>
-                </a:solidFill>
-                <a:latin typeface="+mn-lt"/>
-                <a:ea typeface="+mn-ea"/>
-                <a:cs typeface="+mn-cs"/>
-              </a:defRPr>
-            </a:lvl6pPr>
-            <a:lvl7pPr marL="2743131" algn="l" defTabSz="914377" rtl="0" eaLnBrk="1" latinLnBrk="0" hangingPunct="1">
-              <a:defRPr sz="1800" kern="1200">
-                <a:solidFill>
-                  <a:schemeClr val="lt1"/>
-                </a:solidFill>
-                <a:latin typeface="+mn-lt"/>
-                <a:ea typeface="+mn-ea"/>
-                <a:cs typeface="+mn-cs"/>
-              </a:defRPr>
-            </a:lvl7pPr>
-            <a:lvl8pPr marL="3200320" algn="l" defTabSz="914377" rtl="0" eaLnBrk="1" latinLnBrk="0" hangingPunct="1">
-              <a:defRPr sz="1800" kern="1200">
-                <a:solidFill>
-                  <a:schemeClr val="lt1"/>
-                </a:solidFill>
-                <a:latin typeface="+mn-lt"/>
-                <a:ea typeface="+mn-ea"/>
-                <a:cs typeface="+mn-cs"/>
-              </a:defRPr>
-            </a:lvl8pPr>
-            <a:lvl9pPr marL="3657509" algn="l" defTabSz="914377" rtl="0" eaLnBrk="1" latinLnBrk="0" hangingPunct="1">
-              <a:defRPr sz="1800" kern="1200">
-                <a:solidFill>
-                  <a:schemeClr val="lt1"/>
-                </a:solidFill>
-                <a:latin typeface="+mn-lt"/>
-                <a:ea typeface="+mn-ea"/>
-                <a:cs typeface="+mn-cs"/>
-              </a:defRPr>
-            </a:lvl9pPr>
-          </a:lstStyle>
-          <a:p>
-            <a:pPr algn="ctr"/>
-            <a:r>
-              <a:rPr lang="en-US" sz="900" dirty="0" err="1">
-                <a:solidFill>
-                  <a:schemeClr val="bg1"/>
-                </a:solidFill>
-              </a:rPr>
-              <a:t>LLVG_GRADIENT_impl.h</a:t>
-            </a:r>
-            <a:endParaRPr lang="en-US" sz="900" dirty="0">
-              <a:solidFill>
-                <a:schemeClr val="bg1"/>
-              </a:solidFill>
-            </a:endParaRPr>
-          </a:p>
-        </p:txBody>
-      </p:sp>
-      <p:sp>
-        <p:nvSpPr>
           <p:cNvPr id="15" name="Rounded Rectangle 15">
             <a:extLst>
               <a:ext uri="{FF2B5EF4-FFF2-40B4-BE49-F238E27FC236}">
@@ -10276,164 +10155,6 @@
               </a:rPr>
               <a:t>MICROVG</a:t>
             </a:r>
-          </a:p>
-        </p:txBody>
-      </p:sp>
-      <p:sp>
-        <p:nvSpPr>
-          <p:cNvPr id="17" name="Rounded Rectangle 17">
-            <a:extLst>
-              <a:ext uri="{FF2B5EF4-FFF2-40B4-BE49-F238E27FC236}">
-                <a16:creationId xmlns:a16="http://schemas.microsoft.com/office/drawing/2014/main" id="{095D8A88-ACB9-49C2-BADC-666B799FB62D}"/>
-              </a:ext>
-            </a:extLst>
-          </p:cNvPr>
-          <p:cNvSpPr/>
-          <p:nvPr/>
-        </p:nvSpPr>
-        <p:spPr>
-          <a:xfrm>
-            <a:off x="2357633" y="1485236"/>
-            <a:ext cx="1444752" cy="288000"/>
-          </a:xfrm>
-          <a:prstGeom prst="roundRect">
-            <a:avLst/>
-          </a:prstGeom>
-          <a:solidFill>
-            <a:srgbClr val="00AEC7"/>
-          </a:solidFill>
-          <a:ln>
-            <a:noFill/>
-          </a:ln>
-        </p:spPr>
-        <p:style>
-          <a:lnRef idx="2">
-            <a:schemeClr val="accent1">
-              <a:shade val="50000"/>
-            </a:schemeClr>
-          </a:lnRef>
-          <a:fillRef idx="1">
-            <a:schemeClr val="accent1"/>
-          </a:fillRef>
-          <a:effectRef idx="0">
-            <a:schemeClr val="accent1"/>
-          </a:effectRef>
-          <a:fontRef idx="minor">
-            <a:schemeClr val="lt1"/>
-          </a:fontRef>
-        </p:style>
-        <p:txBody>
-          <a:bodyPr rtlCol="0" anchor="ctr"/>
-          <a:lstStyle>
-            <a:defPPr>
-              <a:defRPr lang="en-US"/>
-            </a:defPPr>
-            <a:lvl1pPr marL="0" algn="l" defTabSz="914377" rtl="0" eaLnBrk="1" latinLnBrk="0" hangingPunct="1">
-              <a:defRPr sz="1800" kern="1200">
-                <a:solidFill>
-                  <a:schemeClr val="lt1"/>
-                </a:solidFill>
-                <a:latin typeface="+mn-lt"/>
-                <a:ea typeface="+mn-ea"/>
-                <a:cs typeface="+mn-cs"/>
-              </a:defRPr>
-            </a:lvl1pPr>
-            <a:lvl2pPr marL="457189" algn="l" defTabSz="914377" rtl="0" eaLnBrk="1" latinLnBrk="0" hangingPunct="1">
-              <a:defRPr sz="1800" kern="1200">
-                <a:solidFill>
-                  <a:schemeClr val="lt1"/>
-                </a:solidFill>
-                <a:latin typeface="+mn-lt"/>
-                <a:ea typeface="+mn-ea"/>
-                <a:cs typeface="+mn-cs"/>
-              </a:defRPr>
-            </a:lvl2pPr>
-            <a:lvl3pPr marL="914377" algn="l" defTabSz="914377" rtl="0" eaLnBrk="1" latinLnBrk="0" hangingPunct="1">
-              <a:defRPr sz="1800" kern="1200">
-                <a:solidFill>
-                  <a:schemeClr val="lt1"/>
-                </a:solidFill>
-                <a:latin typeface="+mn-lt"/>
-                <a:ea typeface="+mn-ea"/>
-                <a:cs typeface="+mn-cs"/>
-              </a:defRPr>
-            </a:lvl3pPr>
-            <a:lvl4pPr marL="1371566" algn="l" defTabSz="914377" rtl="0" eaLnBrk="1" latinLnBrk="0" hangingPunct="1">
-              <a:defRPr sz="1800" kern="1200">
-                <a:solidFill>
-                  <a:schemeClr val="lt1"/>
-                </a:solidFill>
-                <a:latin typeface="+mn-lt"/>
-                <a:ea typeface="+mn-ea"/>
-                <a:cs typeface="+mn-cs"/>
-              </a:defRPr>
-            </a:lvl4pPr>
-            <a:lvl5pPr marL="1828754" algn="l" defTabSz="914377" rtl="0" eaLnBrk="1" latinLnBrk="0" hangingPunct="1">
-              <a:defRPr sz="1800" kern="1200">
-                <a:solidFill>
-                  <a:schemeClr val="lt1"/>
-                </a:solidFill>
-                <a:latin typeface="+mn-lt"/>
-                <a:ea typeface="+mn-ea"/>
-                <a:cs typeface="+mn-cs"/>
-              </a:defRPr>
-            </a:lvl5pPr>
-            <a:lvl6pPr marL="2285943" algn="l" defTabSz="914377" rtl="0" eaLnBrk="1" latinLnBrk="0" hangingPunct="1">
-              <a:defRPr sz="1800" kern="1200">
-                <a:solidFill>
-                  <a:schemeClr val="lt1"/>
-                </a:solidFill>
-                <a:latin typeface="+mn-lt"/>
-                <a:ea typeface="+mn-ea"/>
-                <a:cs typeface="+mn-cs"/>
-              </a:defRPr>
-            </a:lvl6pPr>
-            <a:lvl7pPr marL="2743131" algn="l" defTabSz="914377" rtl="0" eaLnBrk="1" latinLnBrk="0" hangingPunct="1">
-              <a:defRPr sz="1800" kern="1200">
-                <a:solidFill>
-                  <a:schemeClr val="lt1"/>
-                </a:solidFill>
-                <a:latin typeface="+mn-lt"/>
-                <a:ea typeface="+mn-ea"/>
-                <a:cs typeface="+mn-cs"/>
-              </a:defRPr>
-            </a:lvl7pPr>
-            <a:lvl8pPr marL="3200320" algn="l" defTabSz="914377" rtl="0" eaLnBrk="1" latinLnBrk="0" hangingPunct="1">
-              <a:defRPr sz="1800" kern="1200">
-                <a:solidFill>
-                  <a:schemeClr val="lt1"/>
-                </a:solidFill>
-                <a:latin typeface="+mn-lt"/>
-                <a:ea typeface="+mn-ea"/>
-                <a:cs typeface="+mn-cs"/>
-              </a:defRPr>
-            </a:lvl8pPr>
-            <a:lvl9pPr marL="3657509" algn="l" defTabSz="914377" rtl="0" eaLnBrk="1" latinLnBrk="0" hangingPunct="1">
-              <a:defRPr sz="1800" kern="1200">
-                <a:solidFill>
-                  <a:schemeClr val="lt1"/>
-                </a:solidFill>
-                <a:latin typeface="+mn-lt"/>
-                <a:ea typeface="+mn-ea"/>
-                <a:cs typeface="+mn-cs"/>
-              </a:defRPr>
-            </a:lvl9pPr>
-          </a:lstStyle>
-          <a:p>
-            <a:pPr algn="ctr"/>
-            <a:r>
-              <a:rPr lang="en-US" sz="800" dirty="0" err="1">
-                <a:solidFill>
-                  <a:schemeClr val="bg1"/>
-                </a:solidFill>
-              </a:rPr>
-              <a:t>LLVG_XXX_PAINTER_impl.h</a:t>
-            </a:r>
-            <a:endParaRPr lang="en-US" sz="800" dirty="0">
-              <a:solidFill>
-                <a:schemeClr val="bg1"/>
-              </a:solidFill>
-            </a:endParaRPr>
           </a:p>
         </p:txBody>
       </p:sp>
@@ -10825,164 +10546,6 @@
       </p:sp>
       <p:sp>
         <p:nvSpPr>
-          <p:cNvPr id="7" name="Rounded Rectangle 17">
-            <a:extLst>
-              <a:ext uri="{FF2B5EF4-FFF2-40B4-BE49-F238E27FC236}">
-                <a16:creationId xmlns:a16="http://schemas.microsoft.com/office/drawing/2014/main" id="{400A150F-5610-E438-9A21-9CEC072C3A81}"/>
-              </a:ext>
-            </a:extLst>
-          </p:cNvPr>
-          <p:cNvSpPr/>
-          <p:nvPr/>
-        </p:nvSpPr>
-        <p:spPr>
-          <a:xfrm>
-            <a:off x="706064" y="2697592"/>
-            <a:ext cx="1439844" cy="288000"/>
-          </a:xfrm>
-          <a:prstGeom prst="roundRect">
-            <a:avLst/>
-          </a:prstGeom>
-          <a:solidFill>
-            <a:srgbClr val="00AEC7"/>
-          </a:solidFill>
-          <a:ln>
-            <a:noFill/>
-          </a:ln>
-        </p:spPr>
-        <p:style>
-          <a:lnRef idx="2">
-            <a:schemeClr val="accent1">
-              <a:shade val="50000"/>
-            </a:schemeClr>
-          </a:lnRef>
-          <a:fillRef idx="1">
-            <a:schemeClr val="accent1"/>
-          </a:fillRef>
-          <a:effectRef idx="0">
-            <a:schemeClr val="accent1"/>
-          </a:effectRef>
-          <a:fontRef idx="minor">
-            <a:schemeClr val="lt1"/>
-          </a:fontRef>
-        </p:style>
-        <p:txBody>
-          <a:bodyPr rtlCol="0" anchor="ctr"/>
-          <a:lstStyle>
-            <a:defPPr>
-              <a:defRPr lang="en-US"/>
-            </a:defPPr>
-            <a:lvl1pPr marL="0" algn="l" defTabSz="914377" rtl="0" eaLnBrk="1" latinLnBrk="0" hangingPunct="1">
-              <a:defRPr sz="1800" kern="1200">
-                <a:solidFill>
-                  <a:schemeClr val="lt1"/>
-                </a:solidFill>
-                <a:latin typeface="+mn-lt"/>
-                <a:ea typeface="+mn-ea"/>
-                <a:cs typeface="+mn-cs"/>
-              </a:defRPr>
-            </a:lvl1pPr>
-            <a:lvl2pPr marL="457189" algn="l" defTabSz="914377" rtl="0" eaLnBrk="1" latinLnBrk="0" hangingPunct="1">
-              <a:defRPr sz="1800" kern="1200">
-                <a:solidFill>
-                  <a:schemeClr val="lt1"/>
-                </a:solidFill>
-                <a:latin typeface="+mn-lt"/>
-                <a:ea typeface="+mn-ea"/>
-                <a:cs typeface="+mn-cs"/>
-              </a:defRPr>
-            </a:lvl2pPr>
-            <a:lvl3pPr marL="914377" algn="l" defTabSz="914377" rtl="0" eaLnBrk="1" latinLnBrk="0" hangingPunct="1">
-              <a:defRPr sz="1800" kern="1200">
-                <a:solidFill>
-                  <a:schemeClr val="lt1"/>
-                </a:solidFill>
-                <a:latin typeface="+mn-lt"/>
-                <a:ea typeface="+mn-ea"/>
-                <a:cs typeface="+mn-cs"/>
-              </a:defRPr>
-            </a:lvl3pPr>
-            <a:lvl4pPr marL="1371566" algn="l" defTabSz="914377" rtl="0" eaLnBrk="1" latinLnBrk="0" hangingPunct="1">
-              <a:defRPr sz="1800" kern="1200">
-                <a:solidFill>
-                  <a:schemeClr val="lt1"/>
-                </a:solidFill>
-                <a:latin typeface="+mn-lt"/>
-                <a:ea typeface="+mn-ea"/>
-                <a:cs typeface="+mn-cs"/>
-              </a:defRPr>
-            </a:lvl4pPr>
-            <a:lvl5pPr marL="1828754" algn="l" defTabSz="914377" rtl="0" eaLnBrk="1" latinLnBrk="0" hangingPunct="1">
-              <a:defRPr sz="1800" kern="1200">
-                <a:solidFill>
-                  <a:schemeClr val="lt1"/>
-                </a:solidFill>
-                <a:latin typeface="+mn-lt"/>
-                <a:ea typeface="+mn-ea"/>
-                <a:cs typeface="+mn-cs"/>
-              </a:defRPr>
-            </a:lvl5pPr>
-            <a:lvl6pPr marL="2285943" algn="l" defTabSz="914377" rtl="0" eaLnBrk="1" latinLnBrk="0" hangingPunct="1">
-              <a:defRPr sz="1800" kern="1200">
-                <a:solidFill>
-                  <a:schemeClr val="lt1"/>
-                </a:solidFill>
-                <a:latin typeface="+mn-lt"/>
-                <a:ea typeface="+mn-ea"/>
-                <a:cs typeface="+mn-cs"/>
-              </a:defRPr>
-            </a:lvl6pPr>
-            <a:lvl7pPr marL="2743131" algn="l" defTabSz="914377" rtl="0" eaLnBrk="1" latinLnBrk="0" hangingPunct="1">
-              <a:defRPr sz="1800" kern="1200">
-                <a:solidFill>
-                  <a:schemeClr val="lt1"/>
-                </a:solidFill>
-                <a:latin typeface="+mn-lt"/>
-                <a:ea typeface="+mn-ea"/>
-                <a:cs typeface="+mn-cs"/>
-              </a:defRPr>
-            </a:lvl7pPr>
-            <a:lvl8pPr marL="3200320" algn="l" defTabSz="914377" rtl="0" eaLnBrk="1" latinLnBrk="0" hangingPunct="1">
-              <a:defRPr sz="1800" kern="1200">
-                <a:solidFill>
-                  <a:schemeClr val="lt1"/>
-                </a:solidFill>
-                <a:latin typeface="+mn-lt"/>
-                <a:ea typeface="+mn-ea"/>
-                <a:cs typeface="+mn-cs"/>
-              </a:defRPr>
-            </a:lvl8pPr>
-            <a:lvl9pPr marL="3657509" algn="l" defTabSz="914377" rtl="0" eaLnBrk="1" latinLnBrk="0" hangingPunct="1">
-              <a:defRPr sz="1800" kern="1200">
-                <a:solidFill>
-                  <a:schemeClr val="lt1"/>
-                </a:solidFill>
-                <a:latin typeface="+mn-lt"/>
-                <a:ea typeface="+mn-ea"/>
-                <a:cs typeface="+mn-cs"/>
-              </a:defRPr>
-            </a:lvl9pPr>
-          </a:lstStyle>
-          <a:p>
-            <a:pPr algn="ctr"/>
-            <a:r>
-              <a:rPr lang="en-US" sz="1200" dirty="0" err="1">
-                <a:solidFill>
-                  <a:schemeClr val="bg1"/>
-                </a:solidFill>
-              </a:rPr>
-              <a:t>microvg_gradient.h</a:t>
-            </a:r>
-            <a:endParaRPr lang="en-US" sz="1200" dirty="0">
-              <a:solidFill>
-                <a:schemeClr val="bg1"/>
-              </a:solidFill>
-            </a:endParaRPr>
-          </a:p>
-        </p:txBody>
-      </p:sp>
-      <p:sp>
-        <p:nvSpPr>
           <p:cNvPr id="8" name="Rectangle 7">
             <a:extLst>
               <a:ext uri="{FF2B5EF4-FFF2-40B4-BE49-F238E27FC236}">
@@ -11221,13 +10784,14 @@
           </p:cNvPr>
           <p:cNvCxnSpPr>
             <a:cxnSpLocks/>
+            <a:stCxn id="6" idx="0"/>
           </p:cNvCxnSpPr>
           <p:nvPr/>
         </p:nvCxnSpPr>
         <p:spPr>
           <a:xfrm flipV="1">
             <a:off x="1425986" y="889478"/>
-            <a:ext cx="0" cy="2554053"/>
+            <a:ext cx="0" cy="1434222"/>
           </a:xfrm>
           <a:prstGeom prst="line">
             <a:avLst/>
@@ -11246,6 +10810,516 @@
           <a:effectLst/>
         </p:spPr>
       </p:cxnSp>
+      <p:cxnSp>
+        <p:nvCxnSpPr>
+          <p:cNvPr id="4" name="Straight Connector 3">
+            <a:extLst>
+              <a:ext uri="{FF2B5EF4-FFF2-40B4-BE49-F238E27FC236}">
+                <a16:creationId xmlns:a16="http://schemas.microsoft.com/office/drawing/2014/main" id="{79FCD845-E891-DC0F-D2FF-C23AB80AE21F}"/>
+              </a:ext>
+            </a:extLst>
+          </p:cNvPr>
+          <p:cNvCxnSpPr>
+            <a:cxnSpLocks/>
+          </p:cNvCxnSpPr>
+          <p:nvPr/>
+        </p:nvCxnSpPr>
+        <p:spPr>
+          <a:xfrm flipV="1">
+            <a:off x="1425986" y="2611700"/>
+            <a:ext cx="0" cy="817300"/>
+          </a:xfrm>
+          <a:prstGeom prst="line">
+            <a:avLst/>
+          </a:prstGeom>
+          <a:noFill/>
+          <a:ln w="28575" cap="flat" cmpd="sng" algn="ctr">
+            <a:solidFill>
+              <a:srgbClr val="717D83">
+                <a:lumMod val="60000"/>
+                <a:lumOff val="40000"/>
+              </a:srgbClr>
+            </a:solidFill>
+            <a:prstDash val="solid"/>
+            <a:headEnd type="triangle"/>
+          </a:ln>
+          <a:effectLst/>
+        </p:spPr>
+      </p:cxnSp>
+      <p:sp>
+        <p:nvSpPr>
+          <p:cNvPr id="13" name="Rounded Rectangle 12">
+            <a:extLst>
+              <a:ext uri="{FF2B5EF4-FFF2-40B4-BE49-F238E27FC236}">
+                <a16:creationId xmlns:a16="http://schemas.microsoft.com/office/drawing/2014/main" id="{DB796CC1-F8ED-43A6-AE21-7F6FA80A001F}"/>
+              </a:ext>
+            </a:extLst>
+          </p:cNvPr>
+          <p:cNvSpPr/>
+          <p:nvPr/>
+        </p:nvSpPr>
+        <p:spPr>
+          <a:xfrm>
+            <a:off x="706064" y="1485236"/>
+            <a:ext cx="1439844" cy="288000"/>
+          </a:xfrm>
+          <a:prstGeom prst="roundRect">
+            <a:avLst/>
+          </a:prstGeom>
+          <a:solidFill>
+            <a:srgbClr val="00AEC7"/>
+          </a:solidFill>
+          <a:ln>
+            <a:noFill/>
+          </a:ln>
+        </p:spPr>
+        <p:style>
+          <a:lnRef idx="2">
+            <a:schemeClr val="accent1">
+              <a:shade val="50000"/>
+            </a:schemeClr>
+          </a:lnRef>
+          <a:fillRef idx="1">
+            <a:schemeClr val="accent1"/>
+          </a:fillRef>
+          <a:effectRef idx="0">
+            <a:schemeClr val="accent1"/>
+          </a:effectRef>
+          <a:fontRef idx="minor">
+            <a:schemeClr val="lt1"/>
+          </a:fontRef>
+        </p:style>
+        <p:txBody>
+          <a:bodyPr rtlCol="0" anchor="ctr"/>
+          <a:lstStyle>
+            <a:defPPr>
+              <a:defRPr lang="en-US"/>
+            </a:defPPr>
+            <a:lvl1pPr marL="0" algn="l" defTabSz="914377" rtl="0" eaLnBrk="1" latinLnBrk="0" hangingPunct="1">
+              <a:defRPr sz="1800" kern="1200">
+                <a:solidFill>
+                  <a:schemeClr val="lt1"/>
+                </a:solidFill>
+                <a:latin typeface="+mn-lt"/>
+                <a:ea typeface="+mn-ea"/>
+                <a:cs typeface="+mn-cs"/>
+              </a:defRPr>
+            </a:lvl1pPr>
+            <a:lvl2pPr marL="457189" algn="l" defTabSz="914377" rtl="0" eaLnBrk="1" latinLnBrk="0" hangingPunct="1">
+              <a:defRPr sz="1800" kern="1200">
+                <a:solidFill>
+                  <a:schemeClr val="lt1"/>
+                </a:solidFill>
+                <a:latin typeface="+mn-lt"/>
+                <a:ea typeface="+mn-ea"/>
+                <a:cs typeface="+mn-cs"/>
+              </a:defRPr>
+            </a:lvl2pPr>
+            <a:lvl3pPr marL="914377" algn="l" defTabSz="914377" rtl="0" eaLnBrk="1" latinLnBrk="0" hangingPunct="1">
+              <a:defRPr sz="1800" kern="1200">
+                <a:solidFill>
+                  <a:schemeClr val="lt1"/>
+                </a:solidFill>
+                <a:latin typeface="+mn-lt"/>
+                <a:ea typeface="+mn-ea"/>
+                <a:cs typeface="+mn-cs"/>
+              </a:defRPr>
+            </a:lvl3pPr>
+            <a:lvl4pPr marL="1371566" algn="l" defTabSz="914377" rtl="0" eaLnBrk="1" latinLnBrk="0" hangingPunct="1">
+              <a:defRPr sz="1800" kern="1200">
+                <a:solidFill>
+                  <a:schemeClr val="lt1"/>
+                </a:solidFill>
+                <a:latin typeface="+mn-lt"/>
+                <a:ea typeface="+mn-ea"/>
+                <a:cs typeface="+mn-cs"/>
+              </a:defRPr>
+            </a:lvl4pPr>
+            <a:lvl5pPr marL="1828754" algn="l" defTabSz="914377" rtl="0" eaLnBrk="1" latinLnBrk="0" hangingPunct="1">
+              <a:defRPr sz="1800" kern="1200">
+                <a:solidFill>
+                  <a:schemeClr val="lt1"/>
+                </a:solidFill>
+                <a:latin typeface="+mn-lt"/>
+                <a:ea typeface="+mn-ea"/>
+                <a:cs typeface="+mn-cs"/>
+              </a:defRPr>
+            </a:lvl5pPr>
+            <a:lvl6pPr marL="2285943" algn="l" defTabSz="914377" rtl="0" eaLnBrk="1" latinLnBrk="0" hangingPunct="1">
+              <a:defRPr sz="1800" kern="1200">
+                <a:solidFill>
+                  <a:schemeClr val="lt1"/>
+                </a:solidFill>
+                <a:latin typeface="+mn-lt"/>
+                <a:ea typeface="+mn-ea"/>
+                <a:cs typeface="+mn-cs"/>
+              </a:defRPr>
+            </a:lvl6pPr>
+            <a:lvl7pPr marL="2743131" algn="l" defTabSz="914377" rtl="0" eaLnBrk="1" latinLnBrk="0" hangingPunct="1">
+              <a:defRPr sz="1800" kern="1200">
+                <a:solidFill>
+                  <a:schemeClr val="lt1"/>
+                </a:solidFill>
+                <a:latin typeface="+mn-lt"/>
+                <a:ea typeface="+mn-ea"/>
+                <a:cs typeface="+mn-cs"/>
+              </a:defRPr>
+            </a:lvl7pPr>
+            <a:lvl8pPr marL="3200320" algn="l" defTabSz="914377" rtl="0" eaLnBrk="1" latinLnBrk="0" hangingPunct="1">
+              <a:defRPr sz="1800" kern="1200">
+                <a:solidFill>
+                  <a:schemeClr val="lt1"/>
+                </a:solidFill>
+                <a:latin typeface="+mn-lt"/>
+                <a:ea typeface="+mn-ea"/>
+                <a:cs typeface="+mn-cs"/>
+              </a:defRPr>
+            </a:lvl8pPr>
+            <a:lvl9pPr marL="3657509" algn="l" defTabSz="914377" rtl="0" eaLnBrk="1" latinLnBrk="0" hangingPunct="1">
+              <a:defRPr sz="1800" kern="1200">
+                <a:solidFill>
+                  <a:schemeClr val="lt1"/>
+                </a:solidFill>
+                <a:latin typeface="+mn-lt"/>
+                <a:ea typeface="+mn-ea"/>
+                <a:cs typeface="+mn-cs"/>
+              </a:defRPr>
+            </a:lvl9pPr>
+          </a:lstStyle>
+          <a:p>
+            <a:pPr algn="ctr"/>
+            <a:r>
+              <a:rPr lang="en-US" sz="900" dirty="0" err="1">
+                <a:solidFill>
+                  <a:schemeClr val="bg1"/>
+                </a:solidFill>
+              </a:rPr>
+              <a:t>LLVG_GRADIENT_impl.h</a:t>
+            </a:r>
+            <a:endParaRPr lang="en-US" sz="900" dirty="0">
+              <a:solidFill>
+                <a:schemeClr val="bg1"/>
+              </a:solidFill>
+            </a:endParaRPr>
+          </a:p>
+        </p:txBody>
+      </p:sp>
+      <p:sp>
+        <p:nvSpPr>
+          <p:cNvPr id="17" name="Rounded Rectangle 17">
+            <a:extLst>
+              <a:ext uri="{FF2B5EF4-FFF2-40B4-BE49-F238E27FC236}">
+                <a16:creationId xmlns:a16="http://schemas.microsoft.com/office/drawing/2014/main" id="{095D8A88-ACB9-49C2-BADC-666B799FB62D}"/>
+              </a:ext>
+            </a:extLst>
+          </p:cNvPr>
+          <p:cNvSpPr/>
+          <p:nvPr/>
+        </p:nvSpPr>
+        <p:spPr>
+          <a:xfrm>
+            <a:off x="2357633" y="1485236"/>
+            <a:ext cx="1444752" cy="288000"/>
+          </a:xfrm>
+          <a:prstGeom prst="roundRect">
+            <a:avLst/>
+          </a:prstGeom>
+          <a:solidFill>
+            <a:srgbClr val="00AEC7"/>
+          </a:solidFill>
+          <a:ln>
+            <a:noFill/>
+          </a:ln>
+        </p:spPr>
+        <p:style>
+          <a:lnRef idx="2">
+            <a:schemeClr val="accent1">
+              <a:shade val="50000"/>
+            </a:schemeClr>
+          </a:lnRef>
+          <a:fillRef idx="1">
+            <a:schemeClr val="accent1"/>
+          </a:fillRef>
+          <a:effectRef idx="0">
+            <a:schemeClr val="accent1"/>
+          </a:effectRef>
+          <a:fontRef idx="minor">
+            <a:schemeClr val="lt1"/>
+          </a:fontRef>
+        </p:style>
+        <p:txBody>
+          <a:bodyPr rtlCol="0" anchor="ctr"/>
+          <a:lstStyle>
+            <a:defPPr>
+              <a:defRPr lang="en-US"/>
+            </a:defPPr>
+            <a:lvl1pPr marL="0" algn="l" defTabSz="914377" rtl="0" eaLnBrk="1" latinLnBrk="0" hangingPunct="1">
+              <a:defRPr sz="1800" kern="1200">
+                <a:solidFill>
+                  <a:schemeClr val="lt1"/>
+                </a:solidFill>
+                <a:latin typeface="+mn-lt"/>
+                <a:ea typeface="+mn-ea"/>
+                <a:cs typeface="+mn-cs"/>
+              </a:defRPr>
+            </a:lvl1pPr>
+            <a:lvl2pPr marL="457189" algn="l" defTabSz="914377" rtl="0" eaLnBrk="1" latinLnBrk="0" hangingPunct="1">
+              <a:defRPr sz="1800" kern="1200">
+                <a:solidFill>
+                  <a:schemeClr val="lt1"/>
+                </a:solidFill>
+                <a:latin typeface="+mn-lt"/>
+                <a:ea typeface="+mn-ea"/>
+                <a:cs typeface="+mn-cs"/>
+              </a:defRPr>
+            </a:lvl2pPr>
+            <a:lvl3pPr marL="914377" algn="l" defTabSz="914377" rtl="0" eaLnBrk="1" latinLnBrk="0" hangingPunct="1">
+              <a:defRPr sz="1800" kern="1200">
+                <a:solidFill>
+                  <a:schemeClr val="lt1"/>
+                </a:solidFill>
+                <a:latin typeface="+mn-lt"/>
+                <a:ea typeface="+mn-ea"/>
+                <a:cs typeface="+mn-cs"/>
+              </a:defRPr>
+            </a:lvl3pPr>
+            <a:lvl4pPr marL="1371566" algn="l" defTabSz="914377" rtl="0" eaLnBrk="1" latinLnBrk="0" hangingPunct="1">
+              <a:defRPr sz="1800" kern="1200">
+                <a:solidFill>
+                  <a:schemeClr val="lt1"/>
+                </a:solidFill>
+                <a:latin typeface="+mn-lt"/>
+                <a:ea typeface="+mn-ea"/>
+                <a:cs typeface="+mn-cs"/>
+              </a:defRPr>
+            </a:lvl4pPr>
+            <a:lvl5pPr marL="1828754" algn="l" defTabSz="914377" rtl="0" eaLnBrk="1" latinLnBrk="0" hangingPunct="1">
+              <a:defRPr sz="1800" kern="1200">
+                <a:solidFill>
+                  <a:schemeClr val="lt1"/>
+                </a:solidFill>
+                <a:latin typeface="+mn-lt"/>
+                <a:ea typeface="+mn-ea"/>
+                <a:cs typeface="+mn-cs"/>
+              </a:defRPr>
+            </a:lvl5pPr>
+            <a:lvl6pPr marL="2285943" algn="l" defTabSz="914377" rtl="0" eaLnBrk="1" latinLnBrk="0" hangingPunct="1">
+              <a:defRPr sz="1800" kern="1200">
+                <a:solidFill>
+                  <a:schemeClr val="lt1"/>
+                </a:solidFill>
+                <a:latin typeface="+mn-lt"/>
+                <a:ea typeface="+mn-ea"/>
+                <a:cs typeface="+mn-cs"/>
+              </a:defRPr>
+            </a:lvl6pPr>
+            <a:lvl7pPr marL="2743131" algn="l" defTabSz="914377" rtl="0" eaLnBrk="1" latinLnBrk="0" hangingPunct="1">
+              <a:defRPr sz="1800" kern="1200">
+                <a:solidFill>
+                  <a:schemeClr val="lt1"/>
+                </a:solidFill>
+                <a:latin typeface="+mn-lt"/>
+                <a:ea typeface="+mn-ea"/>
+                <a:cs typeface="+mn-cs"/>
+              </a:defRPr>
+            </a:lvl7pPr>
+            <a:lvl8pPr marL="3200320" algn="l" defTabSz="914377" rtl="0" eaLnBrk="1" latinLnBrk="0" hangingPunct="1">
+              <a:defRPr sz="1800" kern="1200">
+                <a:solidFill>
+                  <a:schemeClr val="lt1"/>
+                </a:solidFill>
+                <a:latin typeface="+mn-lt"/>
+                <a:ea typeface="+mn-ea"/>
+                <a:cs typeface="+mn-cs"/>
+              </a:defRPr>
+            </a:lvl8pPr>
+            <a:lvl9pPr marL="3657509" algn="l" defTabSz="914377" rtl="0" eaLnBrk="1" latinLnBrk="0" hangingPunct="1">
+              <a:defRPr sz="1800" kern="1200">
+                <a:solidFill>
+                  <a:schemeClr val="lt1"/>
+                </a:solidFill>
+                <a:latin typeface="+mn-lt"/>
+                <a:ea typeface="+mn-ea"/>
+                <a:cs typeface="+mn-cs"/>
+              </a:defRPr>
+            </a:lvl9pPr>
+          </a:lstStyle>
+          <a:p>
+            <a:pPr algn="ctr"/>
+            <a:r>
+              <a:rPr lang="en-US" sz="800" dirty="0" err="1">
+                <a:solidFill>
+                  <a:schemeClr val="bg1"/>
+                </a:solidFill>
+              </a:rPr>
+              <a:t>LLVG_XXX_PAINTER_impl.h</a:t>
+            </a:r>
+            <a:endParaRPr lang="en-US" sz="800" dirty="0">
+              <a:solidFill>
+                <a:schemeClr val="bg1"/>
+              </a:solidFill>
+            </a:endParaRPr>
+          </a:p>
+        </p:txBody>
+      </p:sp>
+      <p:sp>
+        <p:nvSpPr>
+          <p:cNvPr id="7" name="Rounded Rectangle 17">
+            <a:extLst>
+              <a:ext uri="{FF2B5EF4-FFF2-40B4-BE49-F238E27FC236}">
+                <a16:creationId xmlns:a16="http://schemas.microsoft.com/office/drawing/2014/main" id="{400A150F-5610-E438-9A21-9CEC072C3A81}"/>
+              </a:ext>
+            </a:extLst>
+          </p:cNvPr>
+          <p:cNvSpPr/>
+          <p:nvPr/>
+        </p:nvSpPr>
+        <p:spPr>
+          <a:xfrm>
+            <a:off x="706064" y="2697592"/>
+            <a:ext cx="1439844" cy="288000"/>
+          </a:xfrm>
+          <a:prstGeom prst="roundRect">
+            <a:avLst/>
+          </a:prstGeom>
+          <a:solidFill>
+            <a:srgbClr val="00AEC7"/>
+          </a:solidFill>
+          <a:ln>
+            <a:noFill/>
+          </a:ln>
+        </p:spPr>
+        <p:style>
+          <a:lnRef idx="2">
+            <a:schemeClr val="accent1">
+              <a:shade val="50000"/>
+            </a:schemeClr>
+          </a:lnRef>
+          <a:fillRef idx="1">
+            <a:schemeClr val="accent1"/>
+          </a:fillRef>
+          <a:effectRef idx="0">
+            <a:schemeClr val="accent1"/>
+          </a:effectRef>
+          <a:fontRef idx="minor">
+            <a:schemeClr val="lt1"/>
+          </a:fontRef>
+        </p:style>
+        <p:txBody>
+          <a:bodyPr rtlCol="0" anchor="ctr"/>
+          <a:lstStyle>
+            <a:defPPr>
+              <a:defRPr lang="en-US"/>
+            </a:defPPr>
+            <a:lvl1pPr marL="0" algn="l" defTabSz="914377" rtl="0" eaLnBrk="1" latinLnBrk="0" hangingPunct="1">
+              <a:defRPr sz="1800" kern="1200">
+                <a:solidFill>
+                  <a:schemeClr val="lt1"/>
+                </a:solidFill>
+                <a:latin typeface="+mn-lt"/>
+                <a:ea typeface="+mn-ea"/>
+                <a:cs typeface="+mn-cs"/>
+              </a:defRPr>
+            </a:lvl1pPr>
+            <a:lvl2pPr marL="457189" algn="l" defTabSz="914377" rtl="0" eaLnBrk="1" latinLnBrk="0" hangingPunct="1">
+              <a:defRPr sz="1800" kern="1200">
+                <a:solidFill>
+                  <a:schemeClr val="lt1"/>
+                </a:solidFill>
+                <a:latin typeface="+mn-lt"/>
+                <a:ea typeface="+mn-ea"/>
+                <a:cs typeface="+mn-cs"/>
+              </a:defRPr>
+            </a:lvl2pPr>
+            <a:lvl3pPr marL="914377" algn="l" defTabSz="914377" rtl="0" eaLnBrk="1" latinLnBrk="0" hangingPunct="1">
+              <a:defRPr sz="1800" kern="1200">
+                <a:solidFill>
+                  <a:schemeClr val="lt1"/>
+                </a:solidFill>
+                <a:latin typeface="+mn-lt"/>
+                <a:ea typeface="+mn-ea"/>
+                <a:cs typeface="+mn-cs"/>
+              </a:defRPr>
+            </a:lvl3pPr>
+            <a:lvl4pPr marL="1371566" algn="l" defTabSz="914377" rtl="0" eaLnBrk="1" latinLnBrk="0" hangingPunct="1">
+              <a:defRPr sz="1800" kern="1200">
+                <a:solidFill>
+                  <a:schemeClr val="lt1"/>
+                </a:solidFill>
+                <a:latin typeface="+mn-lt"/>
+                <a:ea typeface="+mn-ea"/>
+                <a:cs typeface="+mn-cs"/>
+              </a:defRPr>
+            </a:lvl4pPr>
+            <a:lvl5pPr marL="1828754" algn="l" defTabSz="914377" rtl="0" eaLnBrk="1" latinLnBrk="0" hangingPunct="1">
+              <a:defRPr sz="1800" kern="1200">
+                <a:solidFill>
+                  <a:schemeClr val="lt1"/>
+                </a:solidFill>
+                <a:latin typeface="+mn-lt"/>
+                <a:ea typeface="+mn-ea"/>
+                <a:cs typeface="+mn-cs"/>
+              </a:defRPr>
+            </a:lvl5pPr>
+            <a:lvl6pPr marL="2285943" algn="l" defTabSz="914377" rtl="0" eaLnBrk="1" latinLnBrk="0" hangingPunct="1">
+              <a:defRPr sz="1800" kern="1200">
+                <a:solidFill>
+                  <a:schemeClr val="lt1"/>
+                </a:solidFill>
+                <a:latin typeface="+mn-lt"/>
+                <a:ea typeface="+mn-ea"/>
+                <a:cs typeface="+mn-cs"/>
+              </a:defRPr>
+            </a:lvl6pPr>
+            <a:lvl7pPr marL="2743131" algn="l" defTabSz="914377" rtl="0" eaLnBrk="1" latinLnBrk="0" hangingPunct="1">
+              <a:defRPr sz="1800" kern="1200">
+                <a:solidFill>
+                  <a:schemeClr val="lt1"/>
+                </a:solidFill>
+                <a:latin typeface="+mn-lt"/>
+                <a:ea typeface="+mn-ea"/>
+                <a:cs typeface="+mn-cs"/>
+              </a:defRPr>
+            </a:lvl7pPr>
+            <a:lvl8pPr marL="3200320" algn="l" defTabSz="914377" rtl="0" eaLnBrk="1" latinLnBrk="0" hangingPunct="1">
+              <a:defRPr sz="1800" kern="1200">
+                <a:solidFill>
+                  <a:schemeClr val="lt1"/>
+                </a:solidFill>
+                <a:latin typeface="+mn-lt"/>
+                <a:ea typeface="+mn-ea"/>
+                <a:cs typeface="+mn-cs"/>
+              </a:defRPr>
+            </a:lvl8pPr>
+            <a:lvl9pPr marL="3657509" algn="l" defTabSz="914377" rtl="0" eaLnBrk="1" latinLnBrk="0" hangingPunct="1">
+              <a:defRPr sz="1800" kern="1200">
+                <a:solidFill>
+                  <a:schemeClr val="lt1"/>
+                </a:solidFill>
+                <a:latin typeface="+mn-lt"/>
+                <a:ea typeface="+mn-ea"/>
+                <a:cs typeface="+mn-cs"/>
+              </a:defRPr>
+            </a:lvl9pPr>
+          </a:lstStyle>
+          <a:p>
+            <a:pPr algn="ctr"/>
+            <a:r>
+              <a:rPr lang="en-US" sz="1200" dirty="0" err="1">
+                <a:solidFill>
+                  <a:schemeClr val="bg1"/>
+                </a:solidFill>
+              </a:rPr>
+              <a:t>microvg_gradient.h</a:t>
+            </a:r>
+            <a:endParaRPr lang="en-US" sz="1200" dirty="0">
+              <a:solidFill>
+                <a:schemeClr val="bg1"/>
+              </a:solidFill>
+            </a:endParaRPr>
+          </a:p>
+        </p:txBody>
+      </p:sp>
     </p:spTree>
     <p:extLst>
       <p:ext uri="{BB962C8B-B14F-4D97-AF65-F5344CB8AC3E}">
@@ -11402,164 +11476,6 @@
       </p:sp>
       <p:sp>
         <p:nvSpPr>
-          <p:cNvPr id="13" name="Rounded Rectangle 12">
-            <a:extLst>
-              <a:ext uri="{FF2B5EF4-FFF2-40B4-BE49-F238E27FC236}">
-                <a16:creationId xmlns:a16="http://schemas.microsoft.com/office/drawing/2014/main" id="{DB796CC1-F8ED-43A6-AE21-7F6FA80A001F}"/>
-              </a:ext>
-            </a:extLst>
-          </p:cNvPr>
-          <p:cNvSpPr/>
-          <p:nvPr/>
-        </p:nvSpPr>
-        <p:spPr>
-          <a:xfrm>
-            <a:off x="706064" y="1485236"/>
-            <a:ext cx="1439844" cy="288000"/>
-          </a:xfrm>
-          <a:prstGeom prst="roundRect">
-            <a:avLst/>
-          </a:prstGeom>
-          <a:solidFill>
-            <a:srgbClr val="00AEC7"/>
-          </a:solidFill>
-          <a:ln>
-            <a:noFill/>
-          </a:ln>
-        </p:spPr>
-        <p:style>
-          <a:lnRef idx="2">
-            <a:schemeClr val="accent1">
-              <a:shade val="50000"/>
-            </a:schemeClr>
-          </a:lnRef>
-          <a:fillRef idx="1">
-            <a:schemeClr val="accent1"/>
-          </a:fillRef>
-          <a:effectRef idx="0">
-            <a:schemeClr val="accent1"/>
-          </a:effectRef>
-          <a:fontRef idx="minor">
-            <a:schemeClr val="lt1"/>
-          </a:fontRef>
-        </p:style>
-        <p:txBody>
-          <a:bodyPr rtlCol="0" anchor="ctr"/>
-          <a:lstStyle>
-            <a:defPPr>
-              <a:defRPr lang="en-US"/>
-            </a:defPPr>
-            <a:lvl1pPr marL="0" algn="l" defTabSz="914377" rtl="0" eaLnBrk="1" latinLnBrk="0" hangingPunct="1">
-              <a:defRPr sz="1800" kern="1200">
-                <a:solidFill>
-                  <a:schemeClr val="lt1"/>
-                </a:solidFill>
-                <a:latin typeface="+mn-lt"/>
-                <a:ea typeface="+mn-ea"/>
-                <a:cs typeface="+mn-cs"/>
-              </a:defRPr>
-            </a:lvl1pPr>
-            <a:lvl2pPr marL="457189" algn="l" defTabSz="914377" rtl="0" eaLnBrk="1" latinLnBrk="0" hangingPunct="1">
-              <a:defRPr sz="1800" kern="1200">
-                <a:solidFill>
-                  <a:schemeClr val="lt1"/>
-                </a:solidFill>
-                <a:latin typeface="+mn-lt"/>
-                <a:ea typeface="+mn-ea"/>
-                <a:cs typeface="+mn-cs"/>
-              </a:defRPr>
-            </a:lvl2pPr>
-            <a:lvl3pPr marL="914377" algn="l" defTabSz="914377" rtl="0" eaLnBrk="1" latinLnBrk="0" hangingPunct="1">
-              <a:defRPr sz="1800" kern="1200">
-                <a:solidFill>
-                  <a:schemeClr val="lt1"/>
-                </a:solidFill>
-                <a:latin typeface="+mn-lt"/>
-                <a:ea typeface="+mn-ea"/>
-                <a:cs typeface="+mn-cs"/>
-              </a:defRPr>
-            </a:lvl3pPr>
-            <a:lvl4pPr marL="1371566" algn="l" defTabSz="914377" rtl="0" eaLnBrk="1" latinLnBrk="0" hangingPunct="1">
-              <a:defRPr sz="1800" kern="1200">
-                <a:solidFill>
-                  <a:schemeClr val="lt1"/>
-                </a:solidFill>
-                <a:latin typeface="+mn-lt"/>
-                <a:ea typeface="+mn-ea"/>
-                <a:cs typeface="+mn-cs"/>
-              </a:defRPr>
-            </a:lvl4pPr>
-            <a:lvl5pPr marL="1828754" algn="l" defTabSz="914377" rtl="0" eaLnBrk="1" latinLnBrk="0" hangingPunct="1">
-              <a:defRPr sz="1800" kern="1200">
-                <a:solidFill>
-                  <a:schemeClr val="lt1"/>
-                </a:solidFill>
-                <a:latin typeface="+mn-lt"/>
-                <a:ea typeface="+mn-ea"/>
-                <a:cs typeface="+mn-cs"/>
-              </a:defRPr>
-            </a:lvl5pPr>
-            <a:lvl6pPr marL="2285943" algn="l" defTabSz="914377" rtl="0" eaLnBrk="1" latinLnBrk="0" hangingPunct="1">
-              <a:defRPr sz="1800" kern="1200">
-                <a:solidFill>
-                  <a:schemeClr val="lt1"/>
-                </a:solidFill>
-                <a:latin typeface="+mn-lt"/>
-                <a:ea typeface="+mn-ea"/>
-                <a:cs typeface="+mn-cs"/>
-              </a:defRPr>
-            </a:lvl6pPr>
-            <a:lvl7pPr marL="2743131" algn="l" defTabSz="914377" rtl="0" eaLnBrk="1" latinLnBrk="0" hangingPunct="1">
-              <a:defRPr sz="1800" kern="1200">
-                <a:solidFill>
-                  <a:schemeClr val="lt1"/>
-                </a:solidFill>
-                <a:latin typeface="+mn-lt"/>
-                <a:ea typeface="+mn-ea"/>
-                <a:cs typeface="+mn-cs"/>
-              </a:defRPr>
-            </a:lvl7pPr>
-            <a:lvl8pPr marL="3200320" algn="l" defTabSz="914377" rtl="0" eaLnBrk="1" latinLnBrk="0" hangingPunct="1">
-              <a:defRPr sz="1800" kern="1200">
-                <a:solidFill>
-                  <a:schemeClr val="lt1"/>
-                </a:solidFill>
-                <a:latin typeface="+mn-lt"/>
-                <a:ea typeface="+mn-ea"/>
-                <a:cs typeface="+mn-cs"/>
-              </a:defRPr>
-            </a:lvl8pPr>
-            <a:lvl9pPr marL="3657509" algn="l" defTabSz="914377" rtl="0" eaLnBrk="1" latinLnBrk="0" hangingPunct="1">
-              <a:defRPr sz="1800" kern="1200">
-                <a:solidFill>
-                  <a:schemeClr val="lt1"/>
-                </a:solidFill>
-                <a:latin typeface="+mn-lt"/>
-                <a:ea typeface="+mn-ea"/>
-                <a:cs typeface="+mn-cs"/>
-              </a:defRPr>
-            </a:lvl9pPr>
-          </a:lstStyle>
-          <a:p>
-            <a:pPr algn="ctr"/>
-            <a:r>
-              <a:rPr lang="en-US" sz="1200" dirty="0" err="1">
-                <a:solidFill>
-                  <a:schemeClr val="bg1"/>
-                </a:solidFill>
-              </a:rPr>
-              <a:t>LLVG_FONT_impl.h</a:t>
-            </a:r>
-            <a:endParaRPr lang="en-US" sz="1200" dirty="0">
-              <a:solidFill>
-                <a:schemeClr val="bg1"/>
-              </a:solidFill>
-            </a:endParaRPr>
-          </a:p>
-        </p:txBody>
-      </p:sp>
-      <p:sp>
-        <p:nvSpPr>
           <p:cNvPr id="15" name="Rounded Rectangle 15">
             <a:extLst>
               <a:ext uri="{FF2B5EF4-FFF2-40B4-BE49-F238E27FC236}">
@@ -11710,164 +11626,6 @@
               </a:rPr>
               <a:t>MICROVG</a:t>
             </a:r>
-          </a:p>
-        </p:txBody>
-      </p:sp>
-      <p:sp>
-        <p:nvSpPr>
-          <p:cNvPr id="17" name="Rounded Rectangle 17">
-            <a:extLst>
-              <a:ext uri="{FF2B5EF4-FFF2-40B4-BE49-F238E27FC236}">
-                <a16:creationId xmlns:a16="http://schemas.microsoft.com/office/drawing/2014/main" id="{095D8A88-ACB9-49C2-BADC-666B799FB62D}"/>
-              </a:ext>
-            </a:extLst>
-          </p:cNvPr>
-          <p:cNvSpPr/>
-          <p:nvPr/>
-        </p:nvSpPr>
-        <p:spPr>
-          <a:xfrm>
-            <a:off x="2357633" y="1485236"/>
-            <a:ext cx="1444752" cy="288000"/>
-          </a:xfrm>
-          <a:prstGeom prst="roundRect">
-            <a:avLst/>
-          </a:prstGeom>
-          <a:solidFill>
-            <a:srgbClr val="00AEC7"/>
-          </a:solidFill>
-          <a:ln>
-            <a:noFill/>
-          </a:ln>
-        </p:spPr>
-        <p:style>
-          <a:lnRef idx="2">
-            <a:schemeClr val="accent1">
-              <a:shade val="50000"/>
-            </a:schemeClr>
-          </a:lnRef>
-          <a:fillRef idx="1">
-            <a:schemeClr val="accent1"/>
-          </a:fillRef>
-          <a:effectRef idx="0">
-            <a:schemeClr val="accent1"/>
-          </a:effectRef>
-          <a:fontRef idx="minor">
-            <a:schemeClr val="lt1"/>
-          </a:fontRef>
-        </p:style>
-        <p:txBody>
-          <a:bodyPr rtlCol="0" anchor="ctr"/>
-          <a:lstStyle>
-            <a:defPPr>
-              <a:defRPr lang="en-US"/>
-            </a:defPPr>
-            <a:lvl1pPr marL="0" algn="l" defTabSz="914377" rtl="0" eaLnBrk="1" latinLnBrk="0" hangingPunct="1">
-              <a:defRPr sz="1800" kern="1200">
-                <a:solidFill>
-                  <a:schemeClr val="lt1"/>
-                </a:solidFill>
-                <a:latin typeface="+mn-lt"/>
-                <a:ea typeface="+mn-ea"/>
-                <a:cs typeface="+mn-cs"/>
-              </a:defRPr>
-            </a:lvl1pPr>
-            <a:lvl2pPr marL="457189" algn="l" defTabSz="914377" rtl="0" eaLnBrk="1" latinLnBrk="0" hangingPunct="1">
-              <a:defRPr sz="1800" kern="1200">
-                <a:solidFill>
-                  <a:schemeClr val="lt1"/>
-                </a:solidFill>
-                <a:latin typeface="+mn-lt"/>
-                <a:ea typeface="+mn-ea"/>
-                <a:cs typeface="+mn-cs"/>
-              </a:defRPr>
-            </a:lvl2pPr>
-            <a:lvl3pPr marL="914377" algn="l" defTabSz="914377" rtl="0" eaLnBrk="1" latinLnBrk="0" hangingPunct="1">
-              <a:defRPr sz="1800" kern="1200">
-                <a:solidFill>
-                  <a:schemeClr val="lt1"/>
-                </a:solidFill>
-                <a:latin typeface="+mn-lt"/>
-                <a:ea typeface="+mn-ea"/>
-                <a:cs typeface="+mn-cs"/>
-              </a:defRPr>
-            </a:lvl3pPr>
-            <a:lvl4pPr marL="1371566" algn="l" defTabSz="914377" rtl="0" eaLnBrk="1" latinLnBrk="0" hangingPunct="1">
-              <a:defRPr sz="1800" kern="1200">
-                <a:solidFill>
-                  <a:schemeClr val="lt1"/>
-                </a:solidFill>
-                <a:latin typeface="+mn-lt"/>
-                <a:ea typeface="+mn-ea"/>
-                <a:cs typeface="+mn-cs"/>
-              </a:defRPr>
-            </a:lvl4pPr>
-            <a:lvl5pPr marL="1828754" algn="l" defTabSz="914377" rtl="0" eaLnBrk="1" latinLnBrk="0" hangingPunct="1">
-              <a:defRPr sz="1800" kern="1200">
-                <a:solidFill>
-                  <a:schemeClr val="lt1"/>
-                </a:solidFill>
-                <a:latin typeface="+mn-lt"/>
-                <a:ea typeface="+mn-ea"/>
-                <a:cs typeface="+mn-cs"/>
-              </a:defRPr>
-            </a:lvl5pPr>
-            <a:lvl6pPr marL="2285943" algn="l" defTabSz="914377" rtl="0" eaLnBrk="1" latinLnBrk="0" hangingPunct="1">
-              <a:defRPr sz="1800" kern="1200">
-                <a:solidFill>
-                  <a:schemeClr val="lt1"/>
-                </a:solidFill>
-                <a:latin typeface="+mn-lt"/>
-                <a:ea typeface="+mn-ea"/>
-                <a:cs typeface="+mn-cs"/>
-              </a:defRPr>
-            </a:lvl6pPr>
-            <a:lvl7pPr marL="2743131" algn="l" defTabSz="914377" rtl="0" eaLnBrk="1" latinLnBrk="0" hangingPunct="1">
-              <a:defRPr sz="1800" kern="1200">
-                <a:solidFill>
-                  <a:schemeClr val="lt1"/>
-                </a:solidFill>
-                <a:latin typeface="+mn-lt"/>
-                <a:ea typeface="+mn-ea"/>
-                <a:cs typeface="+mn-cs"/>
-              </a:defRPr>
-            </a:lvl7pPr>
-            <a:lvl8pPr marL="3200320" algn="l" defTabSz="914377" rtl="0" eaLnBrk="1" latinLnBrk="0" hangingPunct="1">
-              <a:defRPr sz="1800" kern="1200">
-                <a:solidFill>
-                  <a:schemeClr val="lt1"/>
-                </a:solidFill>
-                <a:latin typeface="+mn-lt"/>
-                <a:ea typeface="+mn-ea"/>
-                <a:cs typeface="+mn-cs"/>
-              </a:defRPr>
-            </a:lvl8pPr>
-            <a:lvl9pPr marL="3657509" algn="l" defTabSz="914377" rtl="0" eaLnBrk="1" latinLnBrk="0" hangingPunct="1">
-              <a:defRPr sz="1800" kern="1200">
-                <a:solidFill>
-                  <a:schemeClr val="lt1"/>
-                </a:solidFill>
-                <a:latin typeface="+mn-lt"/>
-                <a:ea typeface="+mn-ea"/>
-                <a:cs typeface="+mn-cs"/>
-              </a:defRPr>
-            </a:lvl9pPr>
-          </a:lstStyle>
-          <a:p>
-            <a:pPr algn="ctr"/>
-            <a:r>
-              <a:rPr lang="en-US" sz="800" dirty="0" err="1">
-                <a:solidFill>
-                  <a:schemeClr val="bg1"/>
-                </a:solidFill>
-              </a:rPr>
-              <a:t>LLVG_FONT_PAINTER_impl.h</a:t>
-            </a:r>
-            <a:endParaRPr lang="en-US" sz="800" dirty="0">
-              <a:solidFill>
-                <a:schemeClr val="bg1"/>
-              </a:solidFill>
-            </a:endParaRPr>
           </a:p>
         </p:txBody>
       </p:sp>
@@ -12095,317 +11853,6 @@
             <a:r>
               <a:rPr lang="en-US" sz="1200" dirty="0"/>
               <a:t>Platform</a:t>
-            </a:r>
-          </a:p>
-        </p:txBody>
-      </p:sp>
-      <p:sp>
-        <p:nvSpPr>
-          <p:cNvPr id="6" name="Rounded Rectangle 12">
-            <a:extLst>
-              <a:ext uri="{FF2B5EF4-FFF2-40B4-BE49-F238E27FC236}">
-                <a16:creationId xmlns:a16="http://schemas.microsoft.com/office/drawing/2014/main" id="{D625740E-7E12-B0B4-69F8-DA550520A2CE}"/>
-              </a:ext>
-            </a:extLst>
-          </p:cNvPr>
-          <p:cNvSpPr/>
-          <p:nvPr/>
-        </p:nvSpPr>
-        <p:spPr>
-          <a:xfrm>
-            <a:off x="706064" y="2323700"/>
-            <a:ext cx="1439844" cy="288000"/>
-          </a:xfrm>
-          <a:prstGeom prst="roundRect">
-            <a:avLst/>
-          </a:prstGeom>
-          <a:solidFill>
-            <a:srgbClr val="00AEC7"/>
-          </a:solidFill>
-          <a:ln>
-            <a:noFill/>
-          </a:ln>
-        </p:spPr>
-        <p:style>
-          <a:lnRef idx="2">
-            <a:schemeClr val="accent1">
-              <a:shade val="50000"/>
-            </a:schemeClr>
-          </a:lnRef>
-          <a:fillRef idx="1">
-            <a:schemeClr val="accent1"/>
-          </a:fillRef>
-          <a:effectRef idx="0">
-            <a:schemeClr val="accent1"/>
-          </a:effectRef>
-          <a:fontRef idx="minor">
-            <a:schemeClr val="lt1"/>
-          </a:fontRef>
-        </p:style>
-        <p:txBody>
-          <a:bodyPr rtlCol="0" anchor="ctr"/>
-          <a:lstStyle>
-            <a:defPPr>
-              <a:defRPr lang="en-US"/>
-            </a:defPPr>
-            <a:lvl1pPr marL="0" algn="l" defTabSz="914377" rtl="0" eaLnBrk="1" latinLnBrk="0" hangingPunct="1">
-              <a:defRPr sz="1800" kern="1200">
-                <a:solidFill>
-                  <a:schemeClr val="lt1"/>
-                </a:solidFill>
-                <a:latin typeface="+mn-lt"/>
-                <a:ea typeface="+mn-ea"/>
-                <a:cs typeface="+mn-cs"/>
-              </a:defRPr>
-            </a:lvl1pPr>
-            <a:lvl2pPr marL="457189" algn="l" defTabSz="914377" rtl="0" eaLnBrk="1" latinLnBrk="0" hangingPunct="1">
-              <a:defRPr sz="1800" kern="1200">
-                <a:solidFill>
-                  <a:schemeClr val="lt1"/>
-                </a:solidFill>
-                <a:latin typeface="+mn-lt"/>
-                <a:ea typeface="+mn-ea"/>
-                <a:cs typeface="+mn-cs"/>
-              </a:defRPr>
-            </a:lvl2pPr>
-            <a:lvl3pPr marL="914377" algn="l" defTabSz="914377" rtl="0" eaLnBrk="1" latinLnBrk="0" hangingPunct="1">
-              <a:defRPr sz="1800" kern="1200">
-                <a:solidFill>
-                  <a:schemeClr val="lt1"/>
-                </a:solidFill>
-                <a:latin typeface="+mn-lt"/>
-                <a:ea typeface="+mn-ea"/>
-                <a:cs typeface="+mn-cs"/>
-              </a:defRPr>
-            </a:lvl3pPr>
-            <a:lvl4pPr marL="1371566" algn="l" defTabSz="914377" rtl="0" eaLnBrk="1" latinLnBrk="0" hangingPunct="1">
-              <a:defRPr sz="1800" kern="1200">
-                <a:solidFill>
-                  <a:schemeClr val="lt1"/>
-                </a:solidFill>
-                <a:latin typeface="+mn-lt"/>
-                <a:ea typeface="+mn-ea"/>
-                <a:cs typeface="+mn-cs"/>
-              </a:defRPr>
-            </a:lvl4pPr>
-            <a:lvl5pPr marL="1828754" algn="l" defTabSz="914377" rtl="0" eaLnBrk="1" latinLnBrk="0" hangingPunct="1">
-              <a:defRPr sz="1800" kern="1200">
-                <a:solidFill>
-                  <a:schemeClr val="lt1"/>
-                </a:solidFill>
-                <a:latin typeface="+mn-lt"/>
-                <a:ea typeface="+mn-ea"/>
-                <a:cs typeface="+mn-cs"/>
-              </a:defRPr>
-            </a:lvl5pPr>
-            <a:lvl6pPr marL="2285943" algn="l" defTabSz="914377" rtl="0" eaLnBrk="1" latinLnBrk="0" hangingPunct="1">
-              <a:defRPr sz="1800" kern="1200">
-                <a:solidFill>
-                  <a:schemeClr val="lt1"/>
-                </a:solidFill>
-                <a:latin typeface="+mn-lt"/>
-                <a:ea typeface="+mn-ea"/>
-                <a:cs typeface="+mn-cs"/>
-              </a:defRPr>
-            </a:lvl6pPr>
-            <a:lvl7pPr marL="2743131" algn="l" defTabSz="914377" rtl="0" eaLnBrk="1" latinLnBrk="0" hangingPunct="1">
-              <a:defRPr sz="1800" kern="1200">
-                <a:solidFill>
-                  <a:schemeClr val="lt1"/>
-                </a:solidFill>
-                <a:latin typeface="+mn-lt"/>
-                <a:ea typeface="+mn-ea"/>
-                <a:cs typeface="+mn-cs"/>
-              </a:defRPr>
-            </a:lvl7pPr>
-            <a:lvl8pPr marL="3200320" algn="l" defTabSz="914377" rtl="0" eaLnBrk="1" latinLnBrk="0" hangingPunct="1">
-              <a:defRPr sz="1800" kern="1200">
-                <a:solidFill>
-                  <a:schemeClr val="lt1"/>
-                </a:solidFill>
-                <a:latin typeface="+mn-lt"/>
-                <a:ea typeface="+mn-ea"/>
-                <a:cs typeface="+mn-cs"/>
-              </a:defRPr>
-            </a:lvl8pPr>
-            <a:lvl9pPr marL="3657509" algn="l" defTabSz="914377" rtl="0" eaLnBrk="1" latinLnBrk="0" hangingPunct="1">
-              <a:defRPr sz="1800" kern="1200">
-                <a:solidFill>
-                  <a:schemeClr val="lt1"/>
-                </a:solidFill>
-                <a:latin typeface="+mn-lt"/>
-                <a:ea typeface="+mn-ea"/>
-                <a:cs typeface="+mn-cs"/>
-              </a:defRPr>
-            </a:lvl9pPr>
-          </a:lstStyle>
-          <a:p>
-            <a:pPr algn="ctr"/>
-            <a:r>
-              <a:rPr lang="en-US" sz="900" dirty="0" err="1">
-                <a:solidFill>
-                  <a:schemeClr val="bg1"/>
-                </a:solidFill>
-              </a:rPr>
-              <a:t>LLVG_FONT_freetype.c</a:t>
-            </a:r>
-            <a:endParaRPr lang="en-US" sz="900" dirty="0">
-              <a:solidFill>
-                <a:schemeClr val="bg1"/>
-              </a:solidFill>
-            </a:endParaRPr>
-          </a:p>
-        </p:txBody>
-      </p:sp>
-      <p:sp>
-        <p:nvSpPr>
-          <p:cNvPr id="7" name="Rounded Rectangle 17">
-            <a:extLst>
-              <a:ext uri="{FF2B5EF4-FFF2-40B4-BE49-F238E27FC236}">
-                <a16:creationId xmlns:a16="http://schemas.microsoft.com/office/drawing/2014/main" id="{400A150F-5610-E438-9A21-9CEC072C3A81}"/>
-              </a:ext>
-            </a:extLst>
-          </p:cNvPr>
-          <p:cNvSpPr/>
-          <p:nvPr/>
-        </p:nvSpPr>
-        <p:spPr>
-          <a:xfrm>
-            <a:off x="706064" y="2697592"/>
-            <a:ext cx="1439844" cy="288000"/>
-          </a:xfrm>
-          <a:prstGeom prst="roundRect">
-            <a:avLst/>
-          </a:prstGeom>
-          <a:solidFill>
-            <a:srgbClr val="EE502E"/>
-          </a:solidFill>
-          <a:ln>
-            <a:noFill/>
-          </a:ln>
-        </p:spPr>
-        <p:style>
-          <a:lnRef idx="2">
-            <a:schemeClr val="accent1">
-              <a:shade val="50000"/>
-            </a:schemeClr>
-          </a:lnRef>
-          <a:fillRef idx="1">
-            <a:schemeClr val="accent1"/>
-          </a:fillRef>
-          <a:effectRef idx="0">
-            <a:schemeClr val="accent1"/>
-          </a:effectRef>
-          <a:fontRef idx="minor">
-            <a:schemeClr val="lt1"/>
-          </a:fontRef>
-        </p:style>
-        <p:txBody>
-          <a:bodyPr rtlCol="0" anchor="ctr"/>
-          <a:lstStyle>
-            <a:defPPr>
-              <a:defRPr lang="en-US"/>
-            </a:defPPr>
-            <a:lvl1pPr marL="0" algn="l" defTabSz="914377" rtl="0" eaLnBrk="1" latinLnBrk="0" hangingPunct="1">
-              <a:defRPr sz="1800" kern="1200">
-                <a:solidFill>
-                  <a:schemeClr val="lt1"/>
-                </a:solidFill>
-                <a:latin typeface="+mn-lt"/>
-                <a:ea typeface="+mn-ea"/>
-                <a:cs typeface="+mn-cs"/>
-              </a:defRPr>
-            </a:lvl1pPr>
-            <a:lvl2pPr marL="457189" algn="l" defTabSz="914377" rtl="0" eaLnBrk="1" latinLnBrk="0" hangingPunct="1">
-              <a:defRPr sz="1800" kern="1200">
-                <a:solidFill>
-                  <a:schemeClr val="lt1"/>
-                </a:solidFill>
-                <a:latin typeface="+mn-lt"/>
-                <a:ea typeface="+mn-ea"/>
-                <a:cs typeface="+mn-cs"/>
-              </a:defRPr>
-            </a:lvl2pPr>
-            <a:lvl3pPr marL="914377" algn="l" defTabSz="914377" rtl="0" eaLnBrk="1" latinLnBrk="0" hangingPunct="1">
-              <a:defRPr sz="1800" kern="1200">
-                <a:solidFill>
-                  <a:schemeClr val="lt1"/>
-                </a:solidFill>
-                <a:latin typeface="+mn-lt"/>
-                <a:ea typeface="+mn-ea"/>
-                <a:cs typeface="+mn-cs"/>
-              </a:defRPr>
-            </a:lvl3pPr>
-            <a:lvl4pPr marL="1371566" algn="l" defTabSz="914377" rtl="0" eaLnBrk="1" latinLnBrk="0" hangingPunct="1">
-              <a:defRPr sz="1800" kern="1200">
-                <a:solidFill>
-                  <a:schemeClr val="lt1"/>
-                </a:solidFill>
-                <a:latin typeface="+mn-lt"/>
-                <a:ea typeface="+mn-ea"/>
-                <a:cs typeface="+mn-cs"/>
-              </a:defRPr>
-            </a:lvl4pPr>
-            <a:lvl5pPr marL="1828754" algn="l" defTabSz="914377" rtl="0" eaLnBrk="1" latinLnBrk="0" hangingPunct="1">
-              <a:defRPr sz="1800" kern="1200">
-                <a:solidFill>
-                  <a:schemeClr val="lt1"/>
-                </a:solidFill>
-                <a:latin typeface="+mn-lt"/>
-                <a:ea typeface="+mn-ea"/>
-                <a:cs typeface="+mn-cs"/>
-              </a:defRPr>
-            </a:lvl5pPr>
-            <a:lvl6pPr marL="2285943" algn="l" defTabSz="914377" rtl="0" eaLnBrk="1" latinLnBrk="0" hangingPunct="1">
-              <a:defRPr sz="1800" kern="1200">
-                <a:solidFill>
-                  <a:schemeClr val="lt1"/>
-                </a:solidFill>
-                <a:latin typeface="+mn-lt"/>
-                <a:ea typeface="+mn-ea"/>
-                <a:cs typeface="+mn-cs"/>
-              </a:defRPr>
-            </a:lvl6pPr>
-            <a:lvl7pPr marL="2743131" algn="l" defTabSz="914377" rtl="0" eaLnBrk="1" latinLnBrk="0" hangingPunct="1">
-              <a:defRPr sz="1800" kern="1200">
-                <a:solidFill>
-                  <a:schemeClr val="lt1"/>
-                </a:solidFill>
-                <a:latin typeface="+mn-lt"/>
-                <a:ea typeface="+mn-ea"/>
-                <a:cs typeface="+mn-cs"/>
-              </a:defRPr>
-            </a:lvl7pPr>
-            <a:lvl8pPr marL="3200320" algn="l" defTabSz="914377" rtl="0" eaLnBrk="1" latinLnBrk="0" hangingPunct="1">
-              <a:defRPr sz="1800" kern="1200">
-                <a:solidFill>
-                  <a:schemeClr val="lt1"/>
-                </a:solidFill>
-                <a:latin typeface="+mn-lt"/>
-                <a:ea typeface="+mn-ea"/>
-                <a:cs typeface="+mn-cs"/>
-              </a:defRPr>
-            </a:lvl8pPr>
-            <a:lvl9pPr marL="3657509" algn="l" defTabSz="914377" rtl="0" eaLnBrk="1" latinLnBrk="0" hangingPunct="1">
-              <a:defRPr sz="1800" kern="1200">
-                <a:solidFill>
-                  <a:schemeClr val="lt1"/>
-                </a:solidFill>
-                <a:latin typeface="+mn-lt"/>
-                <a:ea typeface="+mn-ea"/>
-                <a:cs typeface="+mn-cs"/>
-              </a:defRPr>
-            </a:lvl9pPr>
-          </a:lstStyle>
-          <a:p>
-            <a:pPr algn="ctr"/>
-            <a:r>
-              <a:rPr lang="en-US" sz="1200" dirty="0" err="1"/>
-              <a:t>Freetype</a:t>
-            </a:r>
-            <a:r>
-              <a:rPr lang="en-US" sz="1200" dirty="0"/>
-              <a:t> Engine</a:t>
             </a:r>
           </a:p>
         </p:txBody>
@@ -12677,6 +12124,317 @@
       </p:cxnSp>
       <p:sp>
         <p:nvSpPr>
+          <p:cNvPr id="6" name="Rounded Rectangle 12">
+            <a:extLst>
+              <a:ext uri="{FF2B5EF4-FFF2-40B4-BE49-F238E27FC236}">
+                <a16:creationId xmlns:a16="http://schemas.microsoft.com/office/drawing/2014/main" id="{D625740E-7E12-B0B4-69F8-DA550520A2CE}"/>
+              </a:ext>
+            </a:extLst>
+          </p:cNvPr>
+          <p:cNvSpPr/>
+          <p:nvPr/>
+        </p:nvSpPr>
+        <p:spPr>
+          <a:xfrm>
+            <a:off x="706064" y="2323700"/>
+            <a:ext cx="1439844" cy="288000"/>
+          </a:xfrm>
+          <a:prstGeom prst="roundRect">
+            <a:avLst/>
+          </a:prstGeom>
+          <a:solidFill>
+            <a:srgbClr val="00AEC7"/>
+          </a:solidFill>
+          <a:ln>
+            <a:noFill/>
+          </a:ln>
+        </p:spPr>
+        <p:style>
+          <a:lnRef idx="2">
+            <a:schemeClr val="accent1">
+              <a:shade val="50000"/>
+            </a:schemeClr>
+          </a:lnRef>
+          <a:fillRef idx="1">
+            <a:schemeClr val="accent1"/>
+          </a:fillRef>
+          <a:effectRef idx="0">
+            <a:schemeClr val="accent1"/>
+          </a:effectRef>
+          <a:fontRef idx="minor">
+            <a:schemeClr val="lt1"/>
+          </a:fontRef>
+        </p:style>
+        <p:txBody>
+          <a:bodyPr rtlCol="0" anchor="ctr"/>
+          <a:lstStyle>
+            <a:defPPr>
+              <a:defRPr lang="en-US"/>
+            </a:defPPr>
+            <a:lvl1pPr marL="0" algn="l" defTabSz="914377" rtl="0" eaLnBrk="1" latinLnBrk="0" hangingPunct="1">
+              <a:defRPr sz="1800" kern="1200">
+                <a:solidFill>
+                  <a:schemeClr val="lt1"/>
+                </a:solidFill>
+                <a:latin typeface="+mn-lt"/>
+                <a:ea typeface="+mn-ea"/>
+                <a:cs typeface="+mn-cs"/>
+              </a:defRPr>
+            </a:lvl1pPr>
+            <a:lvl2pPr marL="457189" algn="l" defTabSz="914377" rtl="0" eaLnBrk="1" latinLnBrk="0" hangingPunct="1">
+              <a:defRPr sz="1800" kern="1200">
+                <a:solidFill>
+                  <a:schemeClr val="lt1"/>
+                </a:solidFill>
+                <a:latin typeface="+mn-lt"/>
+                <a:ea typeface="+mn-ea"/>
+                <a:cs typeface="+mn-cs"/>
+              </a:defRPr>
+            </a:lvl2pPr>
+            <a:lvl3pPr marL="914377" algn="l" defTabSz="914377" rtl="0" eaLnBrk="1" latinLnBrk="0" hangingPunct="1">
+              <a:defRPr sz="1800" kern="1200">
+                <a:solidFill>
+                  <a:schemeClr val="lt1"/>
+                </a:solidFill>
+                <a:latin typeface="+mn-lt"/>
+                <a:ea typeface="+mn-ea"/>
+                <a:cs typeface="+mn-cs"/>
+              </a:defRPr>
+            </a:lvl3pPr>
+            <a:lvl4pPr marL="1371566" algn="l" defTabSz="914377" rtl="0" eaLnBrk="1" latinLnBrk="0" hangingPunct="1">
+              <a:defRPr sz="1800" kern="1200">
+                <a:solidFill>
+                  <a:schemeClr val="lt1"/>
+                </a:solidFill>
+                <a:latin typeface="+mn-lt"/>
+                <a:ea typeface="+mn-ea"/>
+                <a:cs typeface="+mn-cs"/>
+              </a:defRPr>
+            </a:lvl4pPr>
+            <a:lvl5pPr marL="1828754" algn="l" defTabSz="914377" rtl="0" eaLnBrk="1" latinLnBrk="0" hangingPunct="1">
+              <a:defRPr sz="1800" kern="1200">
+                <a:solidFill>
+                  <a:schemeClr val="lt1"/>
+                </a:solidFill>
+                <a:latin typeface="+mn-lt"/>
+                <a:ea typeface="+mn-ea"/>
+                <a:cs typeface="+mn-cs"/>
+              </a:defRPr>
+            </a:lvl5pPr>
+            <a:lvl6pPr marL="2285943" algn="l" defTabSz="914377" rtl="0" eaLnBrk="1" latinLnBrk="0" hangingPunct="1">
+              <a:defRPr sz="1800" kern="1200">
+                <a:solidFill>
+                  <a:schemeClr val="lt1"/>
+                </a:solidFill>
+                <a:latin typeface="+mn-lt"/>
+                <a:ea typeface="+mn-ea"/>
+                <a:cs typeface="+mn-cs"/>
+              </a:defRPr>
+            </a:lvl6pPr>
+            <a:lvl7pPr marL="2743131" algn="l" defTabSz="914377" rtl="0" eaLnBrk="1" latinLnBrk="0" hangingPunct="1">
+              <a:defRPr sz="1800" kern="1200">
+                <a:solidFill>
+                  <a:schemeClr val="lt1"/>
+                </a:solidFill>
+                <a:latin typeface="+mn-lt"/>
+                <a:ea typeface="+mn-ea"/>
+                <a:cs typeface="+mn-cs"/>
+              </a:defRPr>
+            </a:lvl7pPr>
+            <a:lvl8pPr marL="3200320" algn="l" defTabSz="914377" rtl="0" eaLnBrk="1" latinLnBrk="0" hangingPunct="1">
+              <a:defRPr sz="1800" kern="1200">
+                <a:solidFill>
+                  <a:schemeClr val="lt1"/>
+                </a:solidFill>
+                <a:latin typeface="+mn-lt"/>
+                <a:ea typeface="+mn-ea"/>
+                <a:cs typeface="+mn-cs"/>
+              </a:defRPr>
+            </a:lvl8pPr>
+            <a:lvl9pPr marL="3657509" algn="l" defTabSz="914377" rtl="0" eaLnBrk="1" latinLnBrk="0" hangingPunct="1">
+              <a:defRPr sz="1800" kern="1200">
+                <a:solidFill>
+                  <a:schemeClr val="lt1"/>
+                </a:solidFill>
+                <a:latin typeface="+mn-lt"/>
+                <a:ea typeface="+mn-ea"/>
+                <a:cs typeface="+mn-cs"/>
+              </a:defRPr>
+            </a:lvl9pPr>
+          </a:lstStyle>
+          <a:p>
+            <a:pPr algn="ctr"/>
+            <a:r>
+              <a:rPr lang="en-US" sz="900" dirty="0" err="1">
+                <a:solidFill>
+                  <a:schemeClr val="bg1"/>
+                </a:solidFill>
+              </a:rPr>
+              <a:t>LLVG_FONT_freetype.c</a:t>
+            </a:r>
+            <a:endParaRPr lang="en-US" sz="900" dirty="0">
+              <a:solidFill>
+                <a:schemeClr val="bg1"/>
+              </a:solidFill>
+            </a:endParaRPr>
+          </a:p>
+        </p:txBody>
+      </p:sp>
+      <p:sp>
+        <p:nvSpPr>
+          <p:cNvPr id="7" name="Rounded Rectangle 17">
+            <a:extLst>
+              <a:ext uri="{FF2B5EF4-FFF2-40B4-BE49-F238E27FC236}">
+                <a16:creationId xmlns:a16="http://schemas.microsoft.com/office/drawing/2014/main" id="{400A150F-5610-E438-9A21-9CEC072C3A81}"/>
+              </a:ext>
+            </a:extLst>
+          </p:cNvPr>
+          <p:cNvSpPr/>
+          <p:nvPr/>
+        </p:nvSpPr>
+        <p:spPr>
+          <a:xfrm>
+            <a:off x="706064" y="2697592"/>
+            <a:ext cx="1439844" cy="288000"/>
+          </a:xfrm>
+          <a:prstGeom prst="roundRect">
+            <a:avLst/>
+          </a:prstGeom>
+          <a:solidFill>
+            <a:srgbClr val="EE502E"/>
+          </a:solidFill>
+          <a:ln>
+            <a:noFill/>
+          </a:ln>
+        </p:spPr>
+        <p:style>
+          <a:lnRef idx="2">
+            <a:schemeClr val="accent1">
+              <a:shade val="50000"/>
+            </a:schemeClr>
+          </a:lnRef>
+          <a:fillRef idx="1">
+            <a:schemeClr val="accent1"/>
+          </a:fillRef>
+          <a:effectRef idx="0">
+            <a:schemeClr val="accent1"/>
+          </a:effectRef>
+          <a:fontRef idx="minor">
+            <a:schemeClr val="lt1"/>
+          </a:fontRef>
+        </p:style>
+        <p:txBody>
+          <a:bodyPr rtlCol="0" anchor="ctr"/>
+          <a:lstStyle>
+            <a:defPPr>
+              <a:defRPr lang="en-US"/>
+            </a:defPPr>
+            <a:lvl1pPr marL="0" algn="l" defTabSz="914377" rtl="0" eaLnBrk="1" latinLnBrk="0" hangingPunct="1">
+              <a:defRPr sz="1800" kern="1200">
+                <a:solidFill>
+                  <a:schemeClr val="lt1"/>
+                </a:solidFill>
+                <a:latin typeface="+mn-lt"/>
+                <a:ea typeface="+mn-ea"/>
+                <a:cs typeface="+mn-cs"/>
+              </a:defRPr>
+            </a:lvl1pPr>
+            <a:lvl2pPr marL="457189" algn="l" defTabSz="914377" rtl="0" eaLnBrk="1" latinLnBrk="0" hangingPunct="1">
+              <a:defRPr sz="1800" kern="1200">
+                <a:solidFill>
+                  <a:schemeClr val="lt1"/>
+                </a:solidFill>
+                <a:latin typeface="+mn-lt"/>
+                <a:ea typeface="+mn-ea"/>
+                <a:cs typeface="+mn-cs"/>
+              </a:defRPr>
+            </a:lvl2pPr>
+            <a:lvl3pPr marL="914377" algn="l" defTabSz="914377" rtl="0" eaLnBrk="1" latinLnBrk="0" hangingPunct="1">
+              <a:defRPr sz="1800" kern="1200">
+                <a:solidFill>
+                  <a:schemeClr val="lt1"/>
+                </a:solidFill>
+                <a:latin typeface="+mn-lt"/>
+                <a:ea typeface="+mn-ea"/>
+                <a:cs typeface="+mn-cs"/>
+              </a:defRPr>
+            </a:lvl3pPr>
+            <a:lvl4pPr marL="1371566" algn="l" defTabSz="914377" rtl="0" eaLnBrk="1" latinLnBrk="0" hangingPunct="1">
+              <a:defRPr sz="1800" kern="1200">
+                <a:solidFill>
+                  <a:schemeClr val="lt1"/>
+                </a:solidFill>
+                <a:latin typeface="+mn-lt"/>
+                <a:ea typeface="+mn-ea"/>
+                <a:cs typeface="+mn-cs"/>
+              </a:defRPr>
+            </a:lvl4pPr>
+            <a:lvl5pPr marL="1828754" algn="l" defTabSz="914377" rtl="0" eaLnBrk="1" latinLnBrk="0" hangingPunct="1">
+              <a:defRPr sz="1800" kern="1200">
+                <a:solidFill>
+                  <a:schemeClr val="lt1"/>
+                </a:solidFill>
+                <a:latin typeface="+mn-lt"/>
+                <a:ea typeface="+mn-ea"/>
+                <a:cs typeface="+mn-cs"/>
+              </a:defRPr>
+            </a:lvl5pPr>
+            <a:lvl6pPr marL="2285943" algn="l" defTabSz="914377" rtl="0" eaLnBrk="1" latinLnBrk="0" hangingPunct="1">
+              <a:defRPr sz="1800" kern="1200">
+                <a:solidFill>
+                  <a:schemeClr val="lt1"/>
+                </a:solidFill>
+                <a:latin typeface="+mn-lt"/>
+                <a:ea typeface="+mn-ea"/>
+                <a:cs typeface="+mn-cs"/>
+              </a:defRPr>
+            </a:lvl6pPr>
+            <a:lvl7pPr marL="2743131" algn="l" defTabSz="914377" rtl="0" eaLnBrk="1" latinLnBrk="0" hangingPunct="1">
+              <a:defRPr sz="1800" kern="1200">
+                <a:solidFill>
+                  <a:schemeClr val="lt1"/>
+                </a:solidFill>
+                <a:latin typeface="+mn-lt"/>
+                <a:ea typeface="+mn-ea"/>
+                <a:cs typeface="+mn-cs"/>
+              </a:defRPr>
+            </a:lvl7pPr>
+            <a:lvl8pPr marL="3200320" algn="l" defTabSz="914377" rtl="0" eaLnBrk="1" latinLnBrk="0" hangingPunct="1">
+              <a:defRPr sz="1800" kern="1200">
+                <a:solidFill>
+                  <a:schemeClr val="lt1"/>
+                </a:solidFill>
+                <a:latin typeface="+mn-lt"/>
+                <a:ea typeface="+mn-ea"/>
+                <a:cs typeface="+mn-cs"/>
+              </a:defRPr>
+            </a:lvl8pPr>
+            <a:lvl9pPr marL="3657509" algn="l" defTabSz="914377" rtl="0" eaLnBrk="1" latinLnBrk="0" hangingPunct="1">
+              <a:defRPr sz="1800" kern="1200">
+                <a:solidFill>
+                  <a:schemeClr val="lt1"/>
+                </a:solidFill>
+                <a:latin typeface="+mn-lt"/>
+                <a:ea typeface="+mn-ea"/>
+                <a:cs typeface="+mn-cs"/>
+              </a:defRPr>
+            </a:lvl9pPr>
+          </a:lstStyle>
+          <a:p>
+            <a:pPr algn="ctr"/>
+            <a:r>
+              <a:rPr lang="en-US" sz="1200" dirty="0" err="1"/>
+              <a:t>Freetype</a:t>
+            </a:r>
+            <a:r>
+              <a:rPr lang="en-US" sz="1200" dirty="0"/>
+              <a:t> Engine</a:t>
+            </a:r>
+          </a:p>
+        </p:txBody>
+      </p:sp>
+      <p:sp>
+        <p:nvSpPr>
           <p:cNvPr id="12" name="Rounded Rectangle 17">
             <a:extLst>
               <a:ext uri="{FF2B5EF4-FFF2-40B4-BE49-F238E27FC236}">
@@ -12825,6 +12583,322 @@
               <a:rPr lang="en-US" sz="1200" dirty="0"/>
               <a:t> Engine</a:t>
             </a:r>
+          </a:p>
+        </p:txBody>
+      </p:sp>
+      <p:sp>
+        <p:nvSpPr>
+          <p:cNvPr id="13" name="Rounded Rectangle 12">
+            <a:extLst>
+              <a:ext uri="{FF2B5EF4-FFF2-40B4-BE49-F238E27FC236}">
+                <a16:creationId xmlns:a16="http://schemas.microsoft.com/office/drawing/2014/main" id="{DB796CC1-F8ED-43A6-AE21-7F6FA80A001F}"/>
+              </a:ext>
+            </a:extLst>
+          </p:cNvPr>
+          <p:cNvSpPr/>
+          <p:nvPr/>
+        </p:nvSpPr>
+        <p:spPr>
+          <a:xfrm>
+            <a:off x="706064" y="1485236"/>
+            <a:ext cx="1439844" cy="288000"/>
+          </a:xfrm>
+          <a:prstGeom prst="roundRect">
+            <a:avLst/>
+          </a:prstGeom>
+          <a:solidFill>
+            <a:srgbClr val="00AEC7"/>
+          </a:solidFill>
+          <a:ln>
+            <a:noFill/>
+          </a:ln>
+        </p:spPr>
+        <p:style>
+          <a:lnRef idx="2">
+            <a:schemeClr val="accent1">
+              <a:shade val="50000"/>
+            </a:schemeClr>
+          </a:lnRef>
+          <a:fillRef idx="1">
+            <a:schemeClr val="accent1"/>
+          </a:fillRef>
+          <a:effectRef idx="0">
+            <a:schemeClr val="accent1"/>
+          </a:effectRef>
+          <a:fontRef idx="minor">
+            <a:schemeClr val="lt1"/>
+          </a:fontRef>
+        </p:style>
+        <p:txBody>
+          <a:bodyPr rtlCol="0" anchor="ctr"/>
+          <a:lstStyle>
+            <a:defPPr>
+              <a:defRPr lang="en-US"/>
+            </a:defPPr>
+            <a:lvl1pPr marL="0" algn="l" defTabSz="914377" rtl="0" eaLnBrk="1" latinLnBrk="0" hangingPunct="1">
+              <a:defRPr sz="1800" kern="1200">
+                <a:solidFill>
+                  <a:schemeClr val="lt1"/>
+                </a:solidFill>
+                <a:latin typeface="+mn-lt"/>
+                <a:ea typeface="+mn-ea"/>
+                <a:cs typeface="+mn-cs"/>
+              </a:defRPr>
+            </a:lvl1pPr>
+            <a:lvl2pPr marL="457189" algn="l" defTabSz="914377" rtl="0" eaLnBrk="1" latinLnBrk="0" hangingPunct="1">
+              <a:defRPr sz="1800" kern="1200">
+                <a:solidFill>
+                  <a:schemeClr val="lt1"/>
+                </a:solidFill>
+                <a:latin typeface="+mn-lt"/>
+                <a:ea typeface="+mn-ea"/>
+                <a:cs typeface="+mn-cs"/>
+              </a:defRPr>
+            </a:lvl2pPr>
+            <a:lvl3pPr marL="914377" algn="l" defTabSz="914377" rtl="0" eaLnBrk="1" latinLnBrk="0" hangingPunct="1">
+              <a:defRPr sz="1800" kern="1200">
+                <a:solidFill>
+                  <a:schemeClr val="lt1"/>
+                </a:solidFill>
+                <a:latin typeface="+mn-lt"/>
+                <a:ea typeface="+mn-ea"/>
+                <a:cs typeface="+mn-cs"/>
+              </a:defRPr>
+            </a:lvl3pPr>
+            <a:lvl4pPr marL="1371566" algn="l" defTabSz="914377" rtl="0" eaLnBrk="1" latinLnBrk="0" hangingPunct="1">
+              <a:defRPr sz="1800" kern="1200">
+                <a:solidFill>
+                  <a:schemeClr val="lt1"/>
+                </a:solidFill>
+                <a:latin typeface="+mn-lt"/>
+                <a:ea typeface="+mn-ea"/>
+                <a:cs typeface="+mn-cs"/>
+              </a:defRPr>
+            </a:lvl4pPr>
+            <a:lvl5pPr marL="1828754" algn="l" defTabSz="914377" rtl="0" eaLnBrk="1" latinLnBrk="0" hangingPunct="1">
+              <a:defRPr sz="1800" kern="1200">
+                <a:solidFill>
+                  <a:schemeClr val="lt1"/>
+                </a:solidFill>
+                <a:latin typeface="+mn-lt"/>
+                <a:ea typeface="+mn-ea"/>
+                <a:cs typeface="+mn-cs"/>
+              </a:defRPr>
+            </a:lvl5pPr>
+            <a:lvl6pPr marL="2285943" algn="l" defTabSz="914377" rtl="0" eaLnBrk="1" latinLnBrk="0" hangingPunct="1">
+              <a:defRPr sz="1800" kern="1200">
+                <a:solidFill>
+                  <a:schemeClr val="lt1"/>
+                </a:solidFill>
+                <a:latin typeface="+mn-lt"/>
+                <a:ea typeface="+mn-ea"/>
+                <a:cs typeface="+mn-cs"/>
+              </a:defRPr>
+            </a:lvl6pPr>
+            <a:lvl7pPr marL="2743131" algn="l" defTabSz="914377" rtl="0" eaLnBrk="1" latinLnBrk="0" hangingPunct="1">
+              <a:defRPr sz="1800" kern="1200">
+                <a:solidFill>
+                  <a:schemeClr val="lt1"/>
+                </a:solidFill>
+                <a:latin typeface="+mn-lt"/>
+                <a:ea typeface="+mn-ea"/>
+                <a:cs typeface="+mn-cs"/>
+              </a:defRPr>
+            </a:lvl7pPr>
+            <a:lvl8pPr marL="3200320" algn="l" defTabSz="914377" rtl="0" eaLnBrk="1" latinLnBrk="0" hangingPunct="1">
+              <a:defRPr sz="1800" kern="1200">
+                <a:solidFill>
+                  <a:schemeClr val="lt1"/>
+                </a:solidFill>
+                <a:latin typeface="+mn-lt"/>
+                <a:ea typeface="+mn-ea"/>
+                <a:cs typeface="+mn-cs"/>
+              </a:defRPr>
+            </a:lvl8pPr>
+            <a:lvl9pPr marL="3657509" algn="l" defTabSz="914377" rtl="0" eaLnBrk="1" latinLnBrk="0" hangingPunct="1">
+              <a:defRPr sz="1800" kern="1200">
+                <a:solidFill>
+                  <a:schemeClr val="lt1"/>
+                </a:solidFill>
+                <a:latin typeface="+mn-lt"/>
+                <a:ea typeface="+mn-ea"/>
+                <a:cs typeface="+mn-cs"/>
+              </a:defRPr>
+            </a:lvl9pPr>
+          </a:lstStyle>
+          <a:p>
+            <a:pPr algn="ctr"/>
+            <a:r>
+              <a:rPr lang="en-US" sz="1200" dirty="0" err="1">
+                <a:solidFill>
+                  <a:schemeClr val="bg1"/>
+                </a:solidFill>
+              </a:rPr>
+              <a:t>LLVG_FONT_impl.h</a:t>
+            </a:r>
+            <a:endParaRPr lang="en-US" sz="1200" dirty="0">
+              <a:solidFill>
+                <a:schemeClr val="bg1"/>
+              </a:solidFill>
+            </a:endParaRPr>
+          </a:p>
+        </p:txBody>
+      </p:sp>
+      <p:sp>
+        <p:nvSpPr>
+          <p:cNvPr id="17" name="Rounded Rectangle 17">
+            <a:extLst>
+              <a:ext uri="{FF2B5EF4-FFF2-40B4-BE49-F238E27FC236}">
+                <a16:creationId xmlns:a16="http://schemas.microsoft.com/office/drawing/2014/main" id="{095D8A88-ACB9-49C2-BADC-666B799FB62D}"/>
+              </a:ext>
+            </a:extLst>
+          </p:cNvPr>
+          <p:cNvSpPr/>
+          <p:nvPr/>
+        </p:nvSpPr>
+        <p:spPr>
+          <a:xfrm>
+            <a:off x="2357633" y="1485236"/>
+            <a:ext cx="1444752" cy="288000"/>
+          </a:xfrm>
+          <a:prstGeom prst="roundRect">
+            <a:avLst/>
+          </a:prstGeom>
+          <a:solidFill>
+            <a:srgbClr val="00AEC7"/>
+          </a:solidFill>
+          <a:ln>
+            <a:noFill/>
+          </a:ln>
+        </p:spPr>
+        <p:style>
+          <a:lnRef idx="2">
+            <a:schemeClr val="accent1">
+              <a:shade val="50000"/>
+            </a:schemeClr>
+          </a:lnRef>
+          <a:fillRef idx="1">
+            <a:schemeClr val="accent1"/>
+          </a:fillRef>
+          <a:effectRef idx="0">
+            <a:schemeClr val="accent1"/>
+          </a:effectRef>
+          <a:fontRef idx="minor">
+            <a:schemeClr val="lt1"/>
+          </a:fontRef>
+        </p:style>
+        <p:txBody>
+          <a:bodyPr rtlCol="0" anchor="ctr"/>
+          <a:lstStyle>
+            <a:defPPr>
+              <a:defRPr lang="en-US"/>
+            </a:defPPr>
+            <a:lvl1pPr marL="0" algn="l" defTabSz="914377" rtl="0" eaLnBrk="1" latinLnBrk="0" hangingPunct="1">
+              <a:defRPr sz="1800" kern="1200">
+                <a:solidFill>
+                  <a:schemeClr val="lt1"/>
+                </a:solidFill>
+                <a:latin typeface="+mn-lt"/>
+                <a:ea typeface="+mn-ea"/>
+                <a:cs typeface="+mn-cs"/>
+              </a:defRPr>
+            </a:lvl1pPr>
+            <a:lvl2pPr marL="457189" algn="l" defTabSz="914377" rtl="0" eaLnBrk="1" latinLnBrk="0" hangingPunct="1">
+              <a:defRPr sz="1800" kern="1200">
+                <a:solidFill>
+                  <a:schemeClr val="lt1"/>
+                </a:solidFill>
+                <a:latin typeface="+mn-lt"/>
+                <a:ea typeface="+mn-ea"/>
+                <a:cs typeface="+mn-cs"/>
+              </a:defRPr>
+            </a:lvl2pPr>
+            <a:lvl3pPr marL="914377" algn="l" defTabSz="914377" rtl="0" eaLnBrk="1" latinLnBrk="0" hangingPunct="1">
+              <a:defRPr sz="1800" kern="1200">
+                <a:solidFill>
+                  <a:schemeClr val="lt1"/>
+                </a:solidFill>
+                <a:latin typeface="+mn-lt"/>
+                <a:ea typeface="+mn-ea"/>
+                <a:cs typeface="+mn-cs"/>
+              </a:defRPr>
+            </a:lvl3pPr>
+            <a:lvl4pPr marL="1371566" algn="l" defTabSz="914377" rtl="0" eaLnBrk="1" latinLnBrk="0" hangingPunct="1">
+              <a:defRPr sz="1800" kern="1200">
+                <a:solidFill>
+                  <a:schemeClr val="lt1"/>
+                </a:solidFill>
+                <a:latin typeface="+mn-lt"/>
+                <a:ea typeface="+mn-ea"/>
+                <a:cs typeface="+mn-cs"/>
+              </a:defRPr>
+            </a:lvl4pPr>
+            <a:lvl5pPr marL="1828754" algn="l" defTabSz="914377" rtl="0" eaLnBrk="1" latinLnBrk="0" hangingPunct="1">
+              <a:defRPr sz="1800" kern="1200">
+                <a:solidFill>
+                  <a:schemeClr val="lt1"/>
+                </a:solidFill>
+                <a:latin typeface="+mn-lt"/>
+                <a:ea typeface="+mn-ea"/>
+                <a:cs typeface="+mn-cs"/>
+              </a:defRPr>
+            </a:lvl5pPr>
+            <a:lvl6pPr marL="2285943" algn="l" defTabSz="914377" rtl="0" eaLnBrk="1" latinLnBrk="0" hangingPunct="1">
+              <a:defRPr sz="1800" kern="1200">
+                <a:solidFill>
+                  <a:schemeClr val="lt1"/>
+                </a:solidFill>
+                <a:latin typeface="+mn-lt"/>
+                <a:ea typeface="+mn-ea"/>
+                <a:cs typeface="+mn-cs"/>
+              </a:defRPr>
+            </a:lvl6pPr>
+            <a:lvl7pPr marL="2743131" algn="l" defTabSz="914377" rtl="0" eaLnBrk="1" latinLnBrk="0" hangingPunct="1">
+              <a:defRPr sz="1800" kern="1200">
+                <a:solidFill>
+                  <a:schemeClr val="lt1"/>
+                </a:solidFill>
+                <a:latin typeface="+mn-lt"/>
+                <a:ea typeface="+mn-ea"/>
+                <a:cs typeface="+mn-cs"/>
+              </a:defRPr>
+            </a:lvl7pPr>
+            <a:lvl8pPr marL="3200320" algn="l" defTabSz="914377" rtl="0" eaLnBrk="1" latinLnBrk="0" hangingPunct="1">
+              <a:defRPr sz="1800" kern="1200">
+                <a:solidFill>
+                  <a:schemeClr val="lt1"/>
+                </a:solidFill>
+                <a:latin typeface="+mn-lt"/>
+                <a:ea typeface="+mn-ea"/>
+                <a:cs typeface="+mn-cs"/>
+              </a:defRPr>
+            </a:lvl8pPr>
+            <a:lvl9pPr marL="3657509" algn="l" defTabSz="914377" rtl="0" eaLnBrk="1" latinLnBrk="0" hangingPunct="1">
+              <a:defRPr sz="1800" kern="1200">
+                <a:solidFill>
+                  <a:schemeClr val="lt1"/>
+                </a:solidFill>
+                <a:latin typeface="+mn-lt"/>
+                <a:ea typeface="+mn-ea"/>
+                <a:cs typeface="+mn-cs"/>
+              </a:defRPr>
+            </a:lvl9pPr>
+          </a:lstStyle>
+          <a:p>
+            <a:pPr algn="ctr"/>
+            <a:r>
+              <a:rPr lang="en-US" sz="800" dirty="0" err="1">
+                <a:solidFill>
+                  <a:schemeClr val="bg1"/>
+                </a:solidFill>
+              </a:rPr>
+              <a:t>LLVG_FONT_PAINTER_impl.h</a:t>
+            </a:r>
+            <a:endParaRPr lang="en-US" sz="800" dirty="0">
+              <a:solidFill>
+                <a:schemeClr val="bg1"/>
+              </a:solidFill>
+            </a:endParaRPr>
           </a:p>
         </p:txBody>
       </p:sp>

</xml_diff>